<commit_message>
ADD_to-do list CURD 기능
</commit_message>
<xml_diff>
--- a/기획서_디자인.pptx
+++ b/기획서_디자인.pptx
@@ -5,14 +5,15 @@
     <p:sldMasterId id="2147483648" r:id="rId1"/>
   </p:sldMasterIdLst>
   <p:notesMasterIdLst>
-    <p:notesMasterId r:id="rId7"/>
+    <p:notesMasterId r:id="rId8"/>
   </p:notesMasterIdLst>
   <p:sldIdLst>
     <p:sldId id="256" r:id="rId2"/>
     <p:sldId id="257" r:id="rId3"/>
     <p:sldId id="259" r:id="rId4"/>
     <p:sldId id="258" r:id="rId5"/>
-    <p:sldId id="260" r:id="rId6"/>
+    <p:sldId id="261" r:id="rId6"/>
+    <p:sldId id="260" r:id="rId7"/>
   </p:sldIdLst>
   <p:sldSz cx="12192000" cy="6858000"/>
   <p:notesSz cx="6858000" cy="9144000"/>
@@ -201,7 +202,7 @@
           <a:p>
             <a:fld id="{9A5417C6-B2B8-4578-AC93-3CC75AF95494}" type="datetimeFigureOut">
               <a:rPr lang="ko-KR" altLang="en-US" smtClean="0"/>
-              <a:t>2024-06-27</a:t>
+              <a:t>2024-06-28</a:t>
             </a:fld>
             <a:endParaRPr lang="ko-KR" altLang="en-US"/>
           </a:p>
@@ -817,6 +818,93 @@
 </p:notes>
 </file>
 
+<file path=ppt/notesSlides/notesSlide5.xml><?xml version="1.0" encoding="utf-8"?>
+<p:notes xmlns:a="http://schemas.openxmlformats.org/drawingml/2006/main" xmlns:r="http://schemas.openxmlformats.org/officeDocument/2006/relationships" xmlns:p="http://schemas.openxmlformats.org/presentationml/2006/main">
+  <p:cSld>
+    <p:spTree>
+      <p:nvGrpSpPr>
+        <p:cNvPr id="1" name=""/>
+        <p:cNvGrpSpPr/>
+        <p:nvPr/>
+      </p:nvGrpSpPr>
+      <p:grpSpPr>
+        <a:xfrm>
+          <a:off x="0" y="0"/>
+          <a:ext cx="0" cy="0"/>
+          <a:chOff x="0" y="0"/>
+          <a:chExt cx="0" cy="0"/>
+        </a:xfrm>
+      </p:grpSpPr>
+      <p:sp>
+        <p:nvSpPr>
+          <p:cNvPr id="2" name="슬라이드 이미지 개체 틀 1"/>
+          <p:cNvSpPr>
+            <a:spLocks noGrp="1" noRot="1" noChangeAspect="1"/>
+          </p:cNvSpPr>
+          <p:nvPr>
+            <p:ph type="sldImg"/>
+          </p:nvPr>
+        </p:nvSpPr>
+        <p:spPr/>
+      </p:sp>
+      <p:sp>
+        <p:nvSpPr>
+          <p:cNvPr id="3" name="슬라이드 노트 개체 틀 2"/>
+          <p:cNvSpPr>
+            <a:spLocks noGrp="1"/>
+          </p:cNvSpPr>
+          <p:nvPr>
+            <p:ph type="body" idx="1"/>
+          </p:nvPr>
+        </p:nvSpPr>
+        <p:spPr/>
+        <p:txBody>
+          <a:bodyPr/>
+          <a:lstStyle/>
+          <a:p>
+            <a:r>
+              <a:rPr lang="ko-KR" altLang="en-US" dirty="0"/>
+              <a:t>일기장 달력</a:t>
+            </a:r>
+          </a:p>
+        </p:txBody>
+      </p:sp>
+      <p:sp>
+        <p:nvSpPr>
+          <p:cNvPr id="4" name="슬라이드 번호 개체 틀 3"/>
+          <p:cNvSpPr>
+            <a:spLocks noGrp="1"/>
+          </p:cNvSpPr>
+          <p:nvPr>
+            <p:ph type="sldNum" sz="quarter" idx="5"/>
+          </p:nvPr>
+        </p:nvSpPr>
+        <p:spPr/>
+        <p:txBody>
+          <a:bodyPr/>
+          <a:lstStyle/>
+          <a:p>
+            <a:fld id="{7C535743-F7E8-41C5-9885-4C3502B33AD2}" type="slidenum">
+              <a:rPr lang="ko-KR" altLang="en-US" smtClean="0"/>
+              <a:t>5</a:t>
+            </a:fld>
+            <a:endParaRPr lang="ko-KR" altLang="en-US"/>
+          </a:p>
+        </p:txBody>
+      </p:sp>
+    </p:spTree>
+    <p:extLst>
+      <p:ext uri="{BB962C8B-B14F-4D97-AF65-F5344CB8AC3E}">
+        <p14:creationId xmlns:p14="http://schemas.microsoft.com/office/powerpoint/2010/main" val="1989209593"/>
+      </p:ext>
+    </p:extLst>
+  </p:cSld>
+  <p:clrMapOvr>
+    <a:masterClrMapping/>
+  </p:clrMapOvr>
+</p:notes>
+</file>
+
 <file path=ppt/slideLayouts/slideLayout1.xml><?xml version="1.0" encoding="utf-8"?>
 <p:sldLayout xmlns:a="http://schemas.openxmlformats.org/drawingml/2006/main" xmlns:r="http://schemas.openxmlformats.org/officeDocument/2006/relationships" xmlns:p="http://schemas.openxmlformats.org/presentationml/2006/main" type="title" preserve="1">
   <p:cSld name="제목 슬라이드">
@@ -964,7 +1052,7 @@
           <a:p>
             <a:fld id="{E24CC532-3C47-4EEB-B7D2-D1B0B6A35748}" type="datetimeFigureOut">
               <a:rPr lang="ko-KR" altLang="en-US" smtClean="0"/>
-              <a:t>2024-06-27</a:t>
+              <a:t>2024-06-28</a:t>
             </a:fld>
             <a:endParaRPr lang="ko-KR" altLang="en-US"/>
           </a:p>
@@ -1162,7 +1250,7 @@
           <a:p>
             <a:fld id="{E24CC532-3C47-4EEB-B7D2-D1B0B6A35748}" type="datetimeFigureOut">
               <a:rPr lang="ko-KR" altLang="en-US" smtClean="0"/>
-              <a:t>2024-06-27</a:t>
+              <a:t>2024-06-28</a:t>
             </a:fld>
             <a:endParaRPr lang="ko-KR" altLang="en-US"/>
           </a:p>
@@ -1370,7 +1458,7 @@
           <a:p>
             <a:fld id="{E24CC532-3C47-4EEB-B7D2-D1B0B6A35748}" type="datetimeFigureOut">
               <a:rPr lang="ko-KR" altLang="en-US" smtClean="0"/>
-              <a:t>2024-06-27</a:t>
+              <a:t>2024-06-28</a:t>
             </a:fld>
             <a:endParaRPr lang="ko-KR" altLang="en-US"/>
           </a:p>
@@ -1568,7 +1656,7 @@
           <a:p>
             <a:fld id="{E24CC532-3C47-4EEB-B7D2-D1B0B6A35748}" type="datetimeFigureOut">
               <a:rPr lang="ko-KR" altLang="en-US" smtClean="0"/>
-              <a:t>2024-06-27</a:t>
+              <a:t>2024-06-28</a:t>
             </a:fld>
             <a:endParaRPr lang="ko-KR" altLang="en-US"/>
           </a:p>
@@ -1843,7 +1931,7 @@
           <a:p>
             <a:fld id="{E24CC532-3C47-4EEB-B7D2-D1B0B6A35748}" type="datetimeFigureOut">
               <a:rPr lang="ko-KR" altLang="en-US" smtClean="0"/>
-              <a:t>2024-06-27</a:t>
+              <a:t>2024-06-28</a:t>
             </a:fld>
             <a:endParaRPr lang="ko-KR" altLang="en-US"/>
           </a:p>
@@ -2108,7 +2196,7 @@
           <a:p>
             <a:fld id="{E24CC532-3C47-4EEB-B7D2-D1B0B6A35748}" type="datetimeFigureOut">
               <a:rPr lang="ko-KR" altLang="en-US" smtClean="0"/>
-              <a:t>2024-06-27</a:t>
+              <a:t>2024-06-28</a:t>
             </a:fld>
             <a:endParaRPr lang="ko-KR" altLang="en-US"/>
           </a:p>
@@ -2520,7 +2608,7 @@
           <a:p>
             <a:fld id="{E24CC532-3C47-4EEB-B7D2-D1B0B6A35748}" type="datetimeFigureOut">
               <a:rPr lang="ko-KR" altLang="en-US" smtClean="0"/>
-              <a:t>2024-06-27</a:t>
+              <a:t>2024-06-28</a:t>
             </a:fld>
             <a:endParaRPr lang="ko-KR" altLang="en-US"/>
           </a:p>
@@ -2661,7 +2749,7 @@
           <a:p>
             <a:fld id="{E24CC532-3C47-4EEB-B7D2-D1B0B6A35748}" type="datetimeFigureOut">
               <a:rPr lang="ko-KR" altLang="en-US" smtClean="0"/>
-              <a:t>2024-06-27</a:t>
+              <a:t>2024-06-28</a:t>
             </a:fld>
             <a:endParaRPr lang="ko-KR" altLang="en-US"/>
           </a:p>
@@ -2774,7 +2862,7 @@
           <a:p>
             <a:fld id="{E24CC532-3C47-4EEB-B7D2-D1B0B6A35748}" type="datetimeFigureOut">
               <a:rPr lang="ko-KR" altLang="en-US" smtClean="0"/>
-              <a:t>2024-06-27</a:t>
+              <a:t>2024-06-28</a:t>
             </a:fld>
             <a:endParaRPr lang="ko-KR" altLang="en-US"/>
           </a:p>
@@ -3085,7 +3173,7 @@
           <a:p>
             <a:fld id="{E24CC532-3C47-4EEB-B7D2-D1B0B6A35748}" type="datetimeFigureOut">
               <a:rPr lang="ko-KR" altLang="en-US" smtClean="0"/>
-              <a:t>2024-06-27</a:t>
+              <a:t>2024-06-28</a:t>
             </a:fld>
             <a:endParaRPr lang="ko-KR" altLang="en-US"/>
           </a:p>
@@ -3373,7 +3461,7 @@
           <a:p>
             <a:fld id="{E24CC532-3C47-4EEB-B7D2-D1B0B6A35748}" type="datetimeFigureOut">
               <a:rPr lang="ko-KR" altLang="en-US" smtClean="0"/>
-              <a:t>2024-06-27</a:t>
+              <a:t>2024-06-28</a:t>
             </a:fld>
             <a:endParaRPr lang="ko-KR" altLang="en-US"/>
           </a:p>
@@ -3614,7 +3702,7 @@
           <a:p>
             <a:fld id="{E24CC532-3C47-4EEB-B7D2-D1B0B6A35748}" type="datetimeFigureOut">
               <a:rPr lang="ko-KR" altLang="en-US" smtClean="0"/>
-              <a:t>2024-06-27</a:t>
+              <a:t>2024-06-28</a:t>
             </a:fld>
             <a:endParaRPr lang="ko-KR" altLang="en-US"/>
           </a:p>
@@ -10065,6 +10153,1122 @@
       </p:grpSpPr>
       <p:sp>
         <p:nvSpPr>
+          <p:cNvPr id="27" name="TextBox 26">
+            <a:extLst>
+              <a:ext uri="{FF2B5EF4-FFF2-40B4-BE49-F238E27FC236}">
+                <a16:creationId xmlns:a16="http://schemas.microsoft.com/office/drawing/2014/main" id="{5FB0B443-C35E-472C-D54E-C723527357BC}"/>
+              </a:ext>
+            </a:extLst>
+          </p:cNvPr>
+          <p:cNvSpPr txBox="1"/>
+          <p:nvPr/>
+        </p:nvSpPr>
+        <p:spPr>
+          <a:xfrm>
+            <a:off x="134619" y="412500"/>
+            <a:ext cx="1812487" cy="369332"/>
+          </a:xfrm>
+          <a:prstGeom prst="rect">
+            <a:avLst/>
+          </a:prstGeom>
+          <a:noFill/>
+        </p:spPr>
+        <p:txBody>
+          <a:bodyPr wrap="square" rtlCol="0">
+            <a:spAutoFit/>
+          </a:bodyPr>
+          <a:lstStyle/>
+          <a:p>
+            <a:pPr algn="ctr"/>
+            <a:r>
+              <a:rPr lang="en-US" altLang="ko-KR" dirty="0"/>
+              <a:t>Side</a:t>
+            </a:r>
+            <a:r>
+              <a:rPr lang="ko-KR" altLang="en-US" dirty="0"/>
+              <a:t> </a:t>
+            </a:r>
+            <a:r>
+              <a:rPr lang="en-US" altLang="ko-KR" dirty="0"/>
+              <a:t>menu</a:t>
+            </a:r>
+            <a:endParaRPr lang="ko-KR" altLang="en-US" dirty="0"/>
+          </a:p>
+        </p:txBody>
+      </p:sp>
+      <p:cxnSp>
+        <p:nvCxnSpPr>
+          <p:cNvPr id="26" name="직선 연결선 25">
+            <a:extLst>
+              <a:ext uri="{FF2B5EF4-FFF2-40B4-BE49-F238E27FC236}">
+                <a16:creationId xmlns:a16="http://schemas.microsoft.com/office/drawing/2014/main" id="{6D979A1A-4F1B-E1D2-BD4C-154CD35ED56D}"/>
+              </a:ext>
+            </a:extLst>
+          </p:cNvPr>
+          <p:cNvCxnSpPr/>
+          <p:nvPr/>
+        </p:nvCxnSpPr>
+        <p:spPr>
+          <a:xfrm>
+            <a:off x="2980521" y="9283837"/>
+            <a:ext cx="6230958" cy="0"/>
+          </a:xfrm>
+          <a:prstGeom prst="line">
+            <a:avLst/>
+          </a:prstGeom>
+          <a:ln w="9525"/>
+        </p:spPr>
+        <p:style>
+          <a:lnRef idx="2">
+            <a:schemeClr val="dk1"/>
+          </a:lnRef>
+          <a:fillRef idx="0">
+            <a:schemeClr val="dk1"/>
+          </a:fillRef>
+          <a:effectRef idx="1">
+            <a:schemeClr val="dk1"/>
+          </a:effectRef>
+          <a:fontRef idx="minor">
+            <a:schemeClr val="tx1"/>
+          </a:fontRef>
+        </p:style>
+      </p:cxnSp>
+      <p:grpSp>
+        <p:nvGrpSpPr>
+          <p:cNvPr id="14" name="그룹 13">
+            <a:extLst>
+              <a:ext uri="{FF2B5EF4-FFF2-40B4-BE49-F238E27FC236}">
+                <a16:creationId xmlns:a16="http://schemas.microsoft.com/office/drawing/2014/main" id="{28911E7E-4EFB-6D52-A138-C4CAF7F3A013}"/>
+              </a:ext>
+            </a:extLst>
+          </p:cNvPr>
+          <p:cNvGrpSpPr/>
+          <p:nvPr/>
+        </p:nvGrpSpPr>
+        <p:grpSpPr>
+          <a:xfrm>
+            <a:off x="2313858" y="1606188"/>
+            <a:ext cx="2866389" cy="3838824"/>
+            <a:chOff x="1682762" y="1606188"/>
+            <a:chExt cx="2866389" cy="3838824"/>
+          </a:xfrm>
+        </p:grpSpPr>
+        <p:sp>
+          <p:nvSpPr>
+            <p:cNvPr id="46" name="TextBox 45">
+              <a:extLst>
+                <a:ext uri="{FF2B5EF4-FFF2-40B4-BE49-F238E27FC236}">
+                  <a16:creationId xmlns:a16="http://schemas.microsoft.com/office/drawing/2014/main" id="{1FD76B9C-0D8E-AB28-D5D5-756DBFF0219E}"/>
+                </a:ext>
+              </a:extLst>
+            </p:cNvPr>
+            <p:cNvSpPr txBox="1"/>
+            <p:nvPr/>
+          </p:nvSpPr>
+          <p:spPr>
+            <a:xfrm>
+              <a:off x="1710533" y="2799876"/>
+              <a:ext cx="2746972" cy="369332"/>
+            </a:xfrm>
+            <a:prstGeom prst="rect">
+              <a:avLst/>
+            </a:prstGeom>
+            <a:noFill/>
+          </p:spPr>
+          <p:txBody>
+            <a:bodyPr wrap="square" rtlCol="0">
+              <a:spAutoFit/>
+            </a:bodyPr>
+            <a:lstStyle/>
+            <a:p>
+              <a:pPr marL="228600" indent="-228600">
+                <a:buFont typeface="+mj-lt"/>
+                <a:buAutoNum type="arabicPeriod"/>
+              </a:pPr>
+              <a:r>
+                <a:rPr lang="ko-KR" altLang="en-US" sz="900" dirty="0">
+                  <a:solidFill>
+                    <a:schemeClr val="accent1">
+                      <a:lumMod val="60000"/>
+                      <a:lumOff val="40000"/>
+                    </a:schemeClr>
+                  </a:solidFill>
+                </a:rPr>
+                <a:t>추가 시 내용만 입력하는 </a:t>
+              </a:r>
+              <a:r>
+                <a:rPr lang="ko-KR" altLang="en-US" sz="900" dirty="0" err="1">
+                  <a:solidFill>
+                    <a:schemeClr val="accent1">
+                      <a:lumMod val="60000"/>
+                      <a:lumOff val="40000"/>
+                    </a:schemeClr>
+                  </a:solidFill>
+                </a:rPr>
+                <a:t>모달</a:t>
+              </a:r>
+              <a:r>
+                <a:rPr lang="ko-KR" altLang="en-US" sz="900" dirty="0">
+                  <a:solidFill>
+                    <a:schemeClr val="accent1">
+                      <a:lumMod val="60000"/>
+                      <a:lumOff val="40000"/>
+                    </a:schemeClr>
+                  </a:solidFill>
+                </a:rPr>
+                <a:t> </a:t>
+              </a:r>
+              <a:r>
+                <a:rPr lang="en-US" altLang="ko-KR" sz="900" dirty="0">
+                  <a:solidFill>
+                    <a:schemeClr val="accent1">
+                      <a:lumMod val="60000"/>
+                      <a:lumOff val="40000"/>
+                    </a:schemeClr>
+                  </a:solidFill>
+                </a:rPr>
+                <a:t>show.</a:t>
+              </a:r>
+              <a:r>
+                <a:rPr lang="ko-KR" altLang="en-US" sz="900" dirty="0">
+                  <a:solidFill>
+                    <a:schemeClr val="accent1">
+                      <a:lumMod val="60000"/>
+                      <a:lumOff val="40000"/>
+                    </a:schemeClr>
+                  </a:solidFill>
+                </a:rPr>
+                <a:t> 날짜는 자동으로 입력한 시점 기입</a:t>
+              </a:r>
+              <a:endParaRPr lang="en-US" altLang="ko-KR" sz="900" dirty="0">
+                <a:solidFill>
+                  <a:schemeClr val="accent1">
+                    <a:lumMod val="60000"/>
+                    <a:lumOff val="40000"/>
+                  </a:schemeClr>
+                </a:solidFill>
+              </a:endParaRPr>
+            </a:p>
+          </p:txBody>
+        </p:sp>
+        <p:sp>
+          <p:nvSpPr>
+            <p:cNvPr id="5" name="다이아몬드 4">
+              <a:extLst>
+                <a:ext uri="{FF2B5EF4-FFF2-40B4-BE49-F238E27FC236}">
+                  <a16:creationId xmlns:a16="http://schemas.microsoft.com/office/drawing/2014/main" id="{B59C36D6-0EA5-9F53-30EE-91D31D4525D7}"/>
+                </a:ext>
+              </a:extLst>
+            </p:cNvPr>
+            <p:cNvSpPr/>
+            <p:nvPr/>
+          </p:nvSpPr>
+          <p:spPr>
+            <a:xfrm>
+              <a:off x="3798305" y="1606188"/>
+              <a:ext cx="750846" cy="1004392"/>
+            </a:xfrm>
+            <a:prstGeom prst="diamond">
+              <a:avLst/>
+            </a:prstGeom>
+            <a:solidFill>
+              <a:srgbClr val="FF8D8D"/>
+            </a:solidFill>
+            <a:ln>
+              <a:noFill/>
+            </a:ln>
+          </p:spPr>
+          <p:style>
+            <a:lnRef idx="2">
+              <a:schemeClr val="accent1">
+                <a:shade val="15000"/>
+              </a:schemeClr>
+            </a:lnRef>
+            <a:fillRef idx="1">
+              <a:schemeClr val="accent1"/>
+            </a:fillRef>
+            <a:effectRef idx="0">
+              <a:schemeClr val="accent1"/>
+            </a:effectRef>
+            <a:fontRef idx="minor">
+              <a:schemeClr val="lt1"/>
+            </a:fontRef>
+          </p:style>
+          <p:txBody>
+            <a:bodyPr wrap="none" rtlCol="0" anchor="ctr"/>
+            <a:lstStyle/>
+            <a:p>
+              <a:pPr algn="ctr"/>
+              <a:r>
+                <a:rPr lang="en-US" altLang="ko-KR" sz="1200" dirty="0">
+                  <a:solidFill>
+                    <a:schemeClr val="bg2">
+                      <a:lumMod val="10000"/>
+                    </a:schemeClr>
+                  </a:solidFill>
+                </a:rPr>
+                <a:t>O</a:t>
+              </a:r>
+            </a:p>
+            <a:p>
+              <a:pPr algn="ctr"/>
+              <a:r>
+                <a:rPr lang="ko-KR" altLang="en-US" sz="1200" dirty="0">
+                  <a:solidFill>
+                    <a:schemeClr val="bg2">
+                      <a:lumMod val="10000"/>
+                    </a:schemeClr>
+                  </a:solidFill>
+                </a:rPr>
+                <a:t>추가</a:t>
+              </a:r>
+              <a:endParaRPr lang="en-US" altLang="ko-KR" sz="1200" dirty="0">
+                <a:solidFill>
+                  <a:schemeClr val="bg2">
+                    <a:lumMod val="10000"/>
+                  </a:schemeClr>
+                </a:solidFill>
+              </a:endParaRPr>
+            </a:p>
+            <a:p>
+              <a:pPr algn="ctr"/>
+              <a:r>
+                <a:rPr lang="en-US" altLang="ko-KR" sz="1050" dirty="0">
+                  <a:solidFill>
+                    <a:schemeClr val="bg2">
+                      <a:lumMod val="10000"/>
+                    </a:schemeClr>
+                  </a:solidFill>
+                </a:rPr>
+                <a:t>(O</a:t>
+              </a:r>
+              <a:r>
+                <a:rPr lang="ko-KR" altLang="en-US" sz="1050" dirty="0">
+                  <a:solidFill>
+                    <a:schemeClr val="bg2">
+                      <a:lumMod val="10000"/>
+                    </a:schemeClr>
+                  </a:solidFill>
+                </a:rPr>
+                <a:t>는 펜슬 아이콘</a:t>
+              </a:r>
+              <a:r>
+                <a:rPr lang="en-US" altLang="ko-KR" sz="1050" dirty="0">
+                  <a:solidFill>
+                    <a:schemeClr val="bg2">
+                      <a:lumMod val="10000"/>
+                    </a:schemeClr>
+                  </a:solidFill>
+                </a:rPr>
+                <a:t>)</a:t>
+              </a:r>
+              <a:endParaRPr lang="ko-KR" altLang="en-US" sz="1050" dirty="0">
+                <a:solidFill>
+                  <a:schemeClr val="bg2">
+                    <a:lumMod val="10000"/>
+                  </a:schemeClr>
+                </a:solidFill>
+              </a:endParaRPr>
+            </a:p>
+          </p:txBody>
+        </p:sp>
+        <p:sp>
+          <p:nvSpPr>
+            <p:cNvPr id="7" name="다이아몬드 6">
+              <a:extLst>
+                <a:ext uri="{FF2B5EF4-FFF2-40B4-BE49-F238E27FC236}">
+                  <a16:creationId xmlns:a16="http://schemas.microsoft.com/office/drawing/2014/main" id="{B2ACD84D-9AC4-15A8-86C5-B3FBDC8F5C47}"/>
+                </a:ext>
+              </a:extLst>
+            </p:cNvPr>
+            <p:cNvSpPr/>
+            <p:nvPr/>
+          </p:nvSpPr>
+          <p:spPr>
+            <a:xfrm>
+              <a:off x="3798305" y="4440620"/>
+              <a:ext cx="750846" cy="1004392"/>
+            </a:xfrm>
+            <a:prstGeom prst="diamond">
+              <a:avLst/>
+            </a:prstGeom>
+            <a:solidFill>
+              <a:srgbClr val="D8E5FF"/>
+            </a:solidFill>
+            <a:ln>
+              <a:noFill/>
+            </a:ln>
+          </p:spPr>
+          <p:style>
+            <a:lnRef idx="2">
+              <a:schemeClr val="accent1">
+                <a:shade val="15000"/>
+              </a:schemeClr>
+            </a:lnRef>
+            <a:fillRef idx="1">
+              <a:schemeClr val="accent1"/>
+            </a:fillRef>
+            <a:effectRef idx="0">
+              <a:schemeClr val="accent1"/>
+            </a:effectRef>
+            <a:fontRef idx="minor">
+              <a:schemeClr val="lt1"/>
+            </a:fontRef>
+          </p:style>
+          <p:txBody>
+            <a:bodyPr wrap="none" rtlCol="0" anchor="ctr"/>
+            <a:lstStyle/>
+            <a:p>
+              <a:pPr algn="ctr"/>
+              <a:r>
+                <a:rPr lang="ko-KR" altLang="en-US" sz="1200" dirty="0">
+                  <a:solidFill>
+                    <a:schemeClr val="bg2">
+                      <a:lumMod val="10000"/>
+                    </a:schemeClr>
+                  </a:solidFill>
+                </a:rPr>
+                <a:t>일기장 </a:t>
+              </a:r>
+              <a:endParaRPr lang="en-US" altLang="ko-KR" sz="1200" dirty="0">
+                <a:solidFill>
+                  <a:schemeClr val="bg2">
+                    <a:lumMod val="10000"/>
+                  </a:schemeClr>
+                </a:solidFill>
+              </a:endParaRPr>
+            </a:p>
+            <a:p>
+              <a:pPr algn="ctr"/>
+              <a:r>
+                <a:rPr lang="ko-KR" altLang="en-US" sz="1200" dirty="0">
+                  <a:solidFill>
+                    <a:schemeClr val="bg2">
+                      <a:lumMod val="10000"/>
+                    </a:schemeClr>
+                  </a:solidFill>
+                </a:rPr>
+                <a:t>보기</a:t>
+              </a:r>
+            </a:p>
+          </p:txBody>
+        </p:sp>
+        <p:sp>
+          <p:nvSpPr>
+            <p:cNvPr id="8" name="TextBox 7">
+              <a:extLst>
+                <a:ext uri="{FF2B5EF4-FFF2-40B4-BE49-F238E27FC236}">
+                  <a16:creationId xmlns:a16="http://schemas.microsoft.com/office/drawing/2014/main" id="{185948CD-CF11-E97D-A73D-BEC8201BE5F7}"/>
+                </a:ext>
+              </a:extLst>
+            </p:cNvPr>
+            <p:cNvSpPr txBox="1"/>
+            <p:nvPr/>
+          </p:nvSpPr>
+          <p:spPr>
+            <a:xfrm>
+              <a:off x="1682762" y="1606188"/>
+              <a:ext cx="1812487" cy="369332"/>
+            </a:xfrm>
+            <a:prstGeom prst="rect">
+              <a:avLst/>
+            </a:prstGeom>
+            <a:noFill/>
+          </p:spPr>
+          <p:txBody>
+            <a:bodyPr wrap="square" rtlCol="0">
+              <a:spAutoFit/>
+            </a:bodyPr>
+            <a:lstStyle/>
+            <a:p>
+              <a:pPr algn="ctr"/>
+              <a:r>
+                <a:rPr lang="en-US" altLang="ko-KR" dirty="0"/>
+                <a:t>To-do</a:t>
+              </a:r>
+              <a:endParaRPr lang="ko-KR" altLang="en-US" dirty="0"/>
+            </a:p>
+          </p:txBody>
+        </p:sp>
+      </p:grpSp>
+      <p:grpSp>
+        <p:nvGrpSpPr>
+          <p:cNvPr id="13" name="그룹 12">
+            <a:extLst>
+              <a:ext uri="{FF2B5EF4-FFF2-40B4-BE49-F238E27FC236}">
+                <a16:creationId xmlns:a16="http://schemas.microsoft.com/office/drawing/2014/main" id="{78A580AA-8010-1F28-AB4D-90586D2EA6CD}"/>
+              </a:ext>
+            </a:extLst>
+          </p:cNvPr>
+          <p:cNvGrpSpPr/>
+          <p:nvPr/>
+        </p:nvGrpSpPr>
+        <p:grpSpPr>
+          <a:xfrm>
+            <a:off x="5648791" y="1485130"/>
+            <a:ext cx="3866196" cy="4385068"/>
+            <a:chOff x="5902288" y="1485130"/>
+            <a:chExt cx="3866196" cy="4385068"/>
+          </a:xfrm>
+        </p:grpSpPr>
+        <p:sp>
+          <p:nvSpPr>
+            <p:cNvPr id="37" name="다이아몬드 36">
+              <a:extLst>
+                <a:ext uri="{FF2B5EF4-FFF2-40B4-BE49-F238E27FC236}">
+                  <a16:creationId xmlns:a16="http://schemas.microsoft.com/office/drawing/2014/main" id="{394D8209-8E29-98E9-78AB-C6070C1F07FA}"/>
+                </a:ext>
+              </a:extLst>
+            </p:cNvPr>
+            <p:cNvSpPr/>
+            <p:nvPr/>
+          </p:nvSpPr>
+          <p:spPr>
+            <a:xfrm>
+              <a:off x="9017638" y="1485130"/>
+              <a:ext cx="750846" cy="1004392"/>
+            </a:xfrm>
+            <a:prstGeom prst="diamond">
+              <a:avLst/>
+            </a:prstGeom>
+            <a:solidFill>
+              <a:srgbClr val="FF8D8D"/>
+            </a:solidFill>
+            <a:ln>
+              <a:noFill/>
+            </a:ln>
+          </p:spPr>
+          <p:style>
+            <a:lnRef idx="2">
+              <a:schemeClr val="accent1">
+                <a:shade val="15000"/>
+              </a:schemeClr>
+            </a:lnRef>
+            <a:fillRef idx="1">
+              <a:schemeClr val="accent1"/>
+            </a:fillRef>
+            <a:effectRef idx="0">
+              <a:schemeClr val="accent1"/>
+            </a:effectRef>
+            <a:fontRef idx="minor">
+              <a:schemeClr val="lt1"/>
+            </a:fontRef>
+          </p:style>
+          <p:txBody>
+            <a:bodyPr wrap="none" rtlCol="0" anchor="ctr"/>
+            <a:lstStyle/>
+            <a:p>
+              <a:pPr algn="ctr"/>
+              <a:r>
+                <a:rPr lang="en-US" altLang="ko-KR" sz="1050" dirty="0">
+                  <a:solidFill>
+                    <a:schemeClr val="bg2">
+                      <a:lumMod val="10000"/>
+                    </a:schemeClr>
+                  </a:solidFill>
+                </a:rPr>
+                <a:t>(</a:t>
+              </a:r>
+              <a:r>
+                <a:rPr lang="ko-KR" altLang="en-US" sz="1050" dirty="0">
+                  <a:solidFill>
+                    <a:schemeClr val="bg2">
+                      <a:lumMod val="10000"/>
+                    </a:schemeClr>
+                  </a:solidFill>
+                </a:rPr>
+                <a:t>펜슬 아이콘</a:t>
+              </a:r>
+              <a:r>
+                <a:rPr lang="en-US" altLang="ko-KR" sz="1050" dirty="0">
+                  <a:solidFill>
+                    <a:schemeClr val="bg2">
+                      <a:lumMod val="10000"/>
+                    </a:schemeClr>
+                  </a:solidFill>
+                </a:rPr>
+                <a:t>)</a:t>
+              </a:r>
+            </a:p>
+            <a:p>
+              <a:pPr algn="ctr"/>
+              <a:r>
+                <a:rPr lang="ko-KR" altLang="en-US" sz="1050" dirty="0">
+                  <a:solidFill>
+                    <a:schemeClr val="bg2">
+                      <a:lumMod val="10000"/>
+                    </a:schemeClr>
+                  </a:solidFill>
+                </a:rPr>
+                <a:t>일기</a:t>
+              </a:r>
+              <a:endParaRPr lang="en-US" altLang="ko-KR" sz="1050" dirty="0">
+                <a:solidFill>
+                  <a:schemeClr val="bg2">
+                    <a:lumMod val="10000"/>
+                  </a:schemeClr>
+                </a:solidFill>
+              </a:endParaRPr>
+            </a:p>
+            <a:p>
+              <a:pPr algn="ctr"/>
+              <a:r>
+                <a:rPr lang="ko-KR" altLang="en-US" sz="1050" dirty="0">
+                  <a:solidFill>
+                    <a:schemeClr val="bg2">
+                      <a:lumMod val="10000"/>
+                    </a:schemeClr>
+                  </a:solidFill>
+                </a:rPr>
+                <a:t>쓰기</a:t>
+              </a:r>
+            </a:p>
+          </p:txBody>
+        </p:sp>
+        <p:sp>
+          <p:nvSpPr>
+            <p:cNvPr id="38" name="다이아몬드 37">
+              <a:extLst>
+                <a:ext uri="{FF2B5EF4-FFF2-40B4-BE49-F238E27FC236}">
+                  <a16:creationId xmlns:a16="http://schemas.microsoft.com/office/drawing/2014/main" id="{F6F6A7F4-7A23-F5E5-0945-0012B55941CC}"/>
+                </a:ext>
+              </a:extLst>
+            </p:cNvPr>
+            <p:cNvSpPr/>
+            <p:nvPr/>
+          </p:nvSpPr>
+          <p:spPr>
+            <a:xfrm>
+              <a:off x="9017638" y="4865806"/>
+              <a:ext cx="750846" cy="1004392"/>
+            </a:xfrm>
+            <a:prstGeom prst="diamond">
+              <a:avLst/>
+            </a:prstGeom>
+            <a:solidFill>
+              <a:srgbClr val="B6EDFF"/>
+            </a:solidFill>
+            <a:ln>
+              <a:noFill/>
+            </a:ln>
+          </p:spPr>
+          <p:style>
+            <a:lnRef idx="2">
+              <a:schemeClr val="accent1">
+                <a:shade val="15000"/>
+              </a:schemeClr>
+            </a:lnRef>
+            <a:fillRef idx="1">
+              <a:schemeClr val="accent1"/>
+            </a:fillRef>
+            <a:effectRef idx="0">
+              <a:schemeClr val="accent1"/>
+            </a:effectRef>
+            <a:fontRef idx="minor">
+              <a:schemeClr val="lt1"/>
+            </a:fontRef>
+          </p:style>
+          <p:txBody>
+            <a:bodyPr wrap="none" rtlCol="0" anchor="ctr"/>
+            <a:lstStyle/>
+            <a:p>
+              <a:pPr algn="ctr"/>
+              <a:r>
+                <a:rPr lang="en-US" altLang="ko-KR" sz="1200" dirty="0">
+                  <a:solidFill>
+                    <a:schemeClr val="bg2">
+                      <a:lumMod val="10000"/>
+                    </a:schemeClr>
+                  </a:solidFill>
+                </a:rPr>
+                <a:t>To-do</a:t>
+              </a:r>
+              <a:r>
+                <a:rPr lang="ko-KR" altLang="en-US" sz="1200" dirty="0">
+                  <a:solidFill>
+                    <a:schemeClr val="bg2">
+                      <a:lumMod val="10000"/>
+                    </a:schemeClr>
+                  </a:solidFill>
+                </a:rPr>
+                <a:t> </a:t>
+              </a:r>
+              <a:endParaRPr lang="en-US" altLang="ko-KR" sz="1200" dirty="0">
+                <a:solidFill>
+                  <a:schemeClr val="bg2">
+                    <a:lumMod val="10000"/>
+                  </a:schemeClr>
+                </a:solidFill>
+              </a:endParaRPr>
+            </a:p>
+            <a:p>
+              <a:pPr algn="ctr"/>
+              <a:r>
+                <a:rPr lang="ko-KR" altLang="en-US" sz="1200" dirty="0">
+                  <a:solidFill>
+                    <a:schemeClr val="bg2">
+                      <a:lumMod val="10000"/>
+                    </a:schemeClr>
+                  </a:solidFill>
+                </a:rPr>
+                <a:t>보기</a:t>
+              </a:r>
+            </a:p>
+          </p:txBody>
+        </p:sp>
+        <p:sp>
+          <p:nvSpPr>
+            <p:cNvPr id="3" name="다이아몬드 2">
+              <a:extLst>
+                <a:ext uri="{FF2B5EF4-FFF2-40B4-BE49-F238E27FC236}">
+                  <a16:creationId xmlns:a16="http://schemas.microsoft.com/office/drawing/2014/main" id="{14095228-4DFE-11EC-D15F-577DE49CB71B}"/>
+                </a:ext>
+              </a:extLst>
+            </p:cNvPr>
+            <p:cNvSpPr/>
+            <p:nvPr/>
+          </p:nvSpPr>
+          <p:spPr>
+            <a:xfrm>
+              <a:off x="9017638" y="2612022"/>
+              <a:ext cx="750846" cy="1004392"/>
+            </a:xfrm>
+            <a:prstGeom prst="diamond">
+              <a:avLst/>
+            </a:prstGeom>
+            <a:solidFill>
+              <a:srgbClr val="D8E5FF"/>
+            </a:solidFill>
+            <a:ln>
+              <a:noFill/>
+            </a:ln>
+          </p:spPr>
+          <p:style>
+            <a:lnRef idx="2">
+              <a:schemeClr val="accent1">
+                <a:shade val="15000"/>
+              </a:schemeClr>
+            </a:lnRef>
+            <a:fillRef idx="1">
+              <a:schemeClr val="accent1"/>
+            </a:fillRef>
+            <a:effectRef idx="0">
+              <a:schemeClr val="accent1"/>
+            </a:effectRef>
+            <a:fontRef idx="minor">
+              <a:schemeClr val="lt1"/>
+            </a:fontRef>
+          </p:style>
+          <p:txBody>
+            <a:bodyPr wrap="none" rtlCol="0" anchor="ctr"/>
+            <a:lstStyle/>
+            <a:p>
+              <a:pPr algn="ctr"/>
+              <a:r>
+                <a:rPr lang="en-US" altLang="ko-KR" sz="1050" dirty="0">
+                  <a:solidFill>
+                    <a:schemeClr val="bg2">
+                      <a:lumMod val="10000"/>
+                    </a:schemeClr>
+                  </a:solidFill>
+                </a:rPr>
+                <a:t>(</a:t>
+              </a:r>
+              <a:r>
+                <a:rPr lang="ko-KR" altLang="en-US" sz="1050" dirty="0">
+                  <a:solidFill>
+                    <a:schemeClr val="bg2">
+                      <a:lumMod val="10000"/>
+                    </a:schemeClr>
+                  </a:solidFill>
+                </a:rPr>
+                <a:t>달력 아이콘</a:t>
+              </a:r>
+              <a:r>
+                <a:rPr lang="en-US" altLang="ko-KR" sz="1050" dirty="0">
+                  <a:solidFill>
+                    <a:schemeClr val="bg2">
+                      <a:lumMod val="10000"/>
+                    </a:schemeClr>
+                  </a:solidFill>
+                </a:rPr>
+                <a:t>)</a:t>
+              </a:r>
+              <a:endParaRPr lang="ko-KR" altLang="en-US" sz="1050" dirty="0">
+                <a:solidFill>
+                  <a:schemeClr val="bg2">
+                    <a:lumMod val="10000"/>
+                  </a:schemeClr>
+                </a:solidFill>
+              </a:endParaRPr>
+            </a:p>
+            <a:p>
+              <a:pPr algn="ctr"/>
+              <a:r>
+                <a:rPr lang="ko-KR" altLang="en-US" sz="1050" dirty="0">
+                  <a:solidFill>
+                    <a:schemeClr val="bg2">
+                      <a:lumMod val="10000"/>
+                    </a:schemeClr>
+                  </a:solidFill>
+                </a:rPr>
+                <a:t>일기</a:t>
+              </a:r>
+              <a:endParaRPr lang="en-US" altLang="ko-KR" sz="1050" dirty="0">
+                <a:solidFill>
+                  <a:schemeClr val="bg2">
+                    <a:lumMod val="10000"/>
+                  </a:schemeClr>
+                </a:solidFill>
+              </a:endParaRPr>
+            </a:p>
+            <a:p>
+              <a:pPr algn="ctr"/>
+              <a:r>
+                <a:rPr lang="ko-KR" altLang="en-US" sz="1050" dirty="0">
+                  <a:solidFill>
+                    <a:schemeClr val="bg2">
+                      <a:lumMod val="10000"/>
+                    </a:schemeClr>
+                  </a:solidFill>
+                </a:rPr>
+                <a:t>보기</a:t>
+              </a:r>
+              <a:endParaRPr lang="en-US" altLang="ko-KR" sz="1050" dirty="0">
+                <a:solidFill>
+                  <a:schemeClr val="bg2">
+                    <a:lumMod val="10000"/>
+                  </a:schemeClr>
+                </a:solidFill>
+              </a:endParaRPr>
+            </a:p>
+          </p:txBody>
+        </p:sp>
+        <p:sp>
+          <p:nvSpPr>
+            <p:cNvPr id="4" name="다이아몬드 3">
+              <a:extLst>
+                <a:ext uri="{FF2B5EF4-FFF2-40B4-BE49-F238E27FC236}">
+                  <a16:creationId xmlns:a16="http://schemas.microsoft.com/office/drawing/2014/main" id="{ABB08307-450E-A6CD-460A-92A8A1EB28A7}"/>
+                </a:ext>
+              </a:extLst>
+            </p:cNvPr>
+            <p:cNvSpPr/>
+            <p:nvPr/>
+          </p:nvSpPr>
+          <p:spPr>
+            <a:xfrm>
+              <a:off x="9017638" y="3738914"/>
+              <a:ext cx="750846" cy="1004392"/>
+            </a:xfrm>
+            <a:prstGeom prst="diamond">
+              <a:avLst/>
+            </a:prstGeom>
+            <a:solidFill>
+              <a:schemeClr val="bg2">
+                <a:lumMod val="90000"/>
+              </a:schemeClr>
+            </a:solidFill>
+            <a:ln>
+              <a:noFill/>
+            </a:ln>
+          </p:spPr>
+          <p:style>
+            <a:lnRef idx="2">
+              <a:schemeClr val="accent1">
+                <a:shade val="15000"/>
+              </a:schemeClr>
+            </a:lnRef>
+            <a:fillRef idx="1">
+              <a:schemeClr val="accent1"/>
+            </a:fillRef>
+            <a:effectRef idx="0">
+              <a:schemeClr val="accent1"/>
+            </a:effectRef>
+            <a:fontRef idx="minor">
+              <a:schemeClr val="lt1"/>
+            </a:fontRef>
+          </p:style>
+          <p:txBody>
+            <a:bodyPr wrap="none" rtlCol="0" anchor="ctr"/>
+            <a:lstStyle/>
+            <a:p>
+              <a:pPr algn="ctr"/>
+              <a:r>
+                <a:rPr lang="en-US" altLang="ko-KR" sz="1050" dirty="0">
+                  <a:solidFill>
+                    <a:schemeClr val="bg2">
+                      <a:lumMod val="10000"/>
+                    </a:schemeClr>
+                  </a:solidFill>
+                </a:rPr>
+                <a:t>(</a:t>
+              </a:r>
+              <a:r>
+                <a:rPr lang="ko-KR" altLang="en-US" sz="1050" dirty="0">
+                  <a:solidFill>
+                    <a:schemeClr val="bg2">
+                      <a:lumMod val="10000"/>
+                    </a:schemeClr>
+                  </a:solidFill>
+                </a:rPr>
+                <a:t>휴지통 아이콘</a:t>
+              </a:r>
+              <a:r>
+                <a:rPr lang="en-US" altLang="ko-KR" sz="1050" dirty="0">
+                  <a:solidFill>
+                    <a:schemeClr val="bg2">
+                      <a:lumMod val="10000"/>
+                    </a:schemeClr>
+                  </a:solidFill>
+                </a:rPr>
+                <a:t>)</a:t>
+              </a:r>
+            </a:p>
+            <a:p>
+              <a:pPr algn="ctr"/>
+              <a:r>
+                <a:rPr lang="ko-KR" altLang="en-US" sz="1050" dirty="0">
+                  <a:solidFill>
+                    <a:schemeClr val="bg2">
+                      <a:lumMod val="10000"/>
+                    </a:schemeClr>
+                  </a:solidFill>
+                </a:rPr>
+                <a:t>일기</a:t>
+              </a:r>
+              <a:endParaRPr lang="en-US" altLang="ko-KR" sz="1050" dirty="0">
+                <a:solidFill>
+                  <a:schemeClr val="bg2">
+                    <a:lumMod val="10000"/>
+                  </a:schemeClr>
+                </a:solidFill>
+              </a:endParaRPr>
+            </a:p>
+            <a:p>
+              <a:pPr algn="ctr"/>
+              <a:r>
+                <a:rPr lang="ko-KR" altLang="en-US" sz="1050" dirty="0">
+                  <a:solidFill>
+                    <a:schemeClr val="bg2">
+                      <a:lumMod val="10000"/>
+                    </a:schemeClr>
+                  </a:solidFill>
+                </a:rPr>
+                <a:t>삭제</a:t>
+              </a:r>
+            </a:p>
+          </p:txBody>
+        </p:sp>
+        <p:sp>
+          <p:nvSpPr>
+            <p:cNvPr id="9" name="TextBox 8">
+              <a:extLst>
+                <a:ext uri="{FF2B5EF4-FFF2-40B4-BE49-F238E27FC236}">
+                  <a16:creationId xmlns:a16="http://schemas.microsoft.com/office/drawing/2014/main" id="{DAD6535E-D1EB-11A5-CF1F-E3701352B0EE}"/>
+                </a:ext>
+              </a:extLst>
+            </p:cNvPr>
+            <p:cNvSpPr txBox="1"/>
+            <p:nvPr/>
+          </p:nvSpPr>
+          <p:spPr>
+            <a:xfrm>
+              <a:off x="6736607" y="1606188"/>
+              <a:ext cx="1812487" cy="369332"/>
+            </a:xfrm>
+            <a:prstGeom prst="rect">
+              <a:avLst/>
+            </a:prstGeom>
+            <a:noFill/>
+          </p:spPr>
+          <p:txBody>
+            <a:bodyPr wrap="square" rtlCol="0">
+              <a:spAutoFit/>
+            </a:bodyPr>
+            <a:lstStyle/>
+            <a:p>
+              <a:pPr algn="ctr"/>
+              <a:r>
+                <a:rPr lang="ko-KR" altLang="en-US" dirty="0"/>
+                <a:t>일기장</a:t>
+              </a:r>
+            </a:p>
+          </p:txBody>
+        </p:sp>
+        <p:sp>
+          <p:nvSpPr>
+            <p:cNvPr id="10" name="TextBox 9">
+              <a:extLst>
+                <a:ext uri="{FF2B5EF4-FFF2-40B4-BE49-F238E27FC236}">
+                  <a16:creationId xmlns:a16="http://schemas.microsoft.com/office/drawing/2014/main" id="{A5DC730E-F70E-B9C0-07F9-E80DCF0712B2}"/>
+                </a:ext>
+              </a:extLst>
+            </p:cNvPr>
+            <p:cNvSpPr txBox="1"/>
+            <p:nvPr/>
+          </p:nvSpPr>
+          <p:spPr>
+            <a:xfrm>
+              <a:off x="5902288" y="2799876"/>
+              <a:ext cx="2746972" cy="646331"/>
+            </a:xfrm>
+            <a:prstGeom prst="rect">
+              <a:avLst/>
+            </a:prstGeom>
+            <a:noFill/>
+          </p:spPr>
+          <p:txBody>
+            <a:bodyPr wrap="square" rtlCol="0">
+              <a:spAutoFit/>
+            </a:bodyPr>
+            <a:lstStyle/>
+            <a:p>
+              <a:pPr marL="228600" indent="-228600">
+                <a:buFont typeface="+mj-lt"/>
+                <a:buAutoNum type="arabicPeriod"/>
+              </a:pPr>
+              <a:r>
+                <a:rPr lang="ko-KR" altLang="en-US" sz="900" dirty="0">
+                  <a:solidFill>
+                    <a:schemeClr val="accent1">
+                      <a:lumMod val="60000"/>
+                      <a:lumOff val="40000"/>
+                    </a:schemeClr>
+                  </a:solidFill>
+                </a:rPr>
+                <a:t>추가 시 쓰기 페이지로 이동</a:t>
+              </a:r>
+              <a:endParaRPr lang="en-US" altLang="ko-KR" sz="900" dirty="0">
+                <a:solidFill>
+                  <a:schemeClr val="accent1">
+                    <a:lumMod val="60000"/>
+                    <a:lumOff val="40000"/>
+                  </a:schemeClr>
+                </a:solidFill>
+              </a:endParaRPr>
+            </a:p>
+            <a:p>
+              <a:pPr marL="228600" indent="-228600">
+                <a:buFont typeface="+mj-lt"/>
+                <a:buAutoNum type="arabicPeriod"/>
+              </a:pPr>
+              <a:r>
+                <a:rPr lang="ko-KR" altLang="en-US" sz="900" dirty="0">
+                  <a:solidFill>
+                    <a:schemeClr val="accent1">
+                      <a:lumMod val="60000"/>
+                      <a:lumOff val="40000"/>
+                    </a:schemeClr>
+                  </a:solidFill>
+                </a:rPr>
+                <a:t>달력 아이콘 클릭 시 페이지 이동</a:t>
+              </a:r>
+              <a:endParaRPr lang="en-US" altLang="ko-KR" sz="900" dirty="0">
+                <a:solidFill>
+                  <a:schemeClr val="accent1">
+                    <a:lumMod val="60000"/>
+                    <a:lumOff val="40000"/>
+                  </a:schemeClr>
+                </a:solidFill>
+              </a:endParaRPr>
+            </a:p>
+            <a:p>
+              <a:pPr marL="228600" indent="-228600">
+                <a:buFont typeface="+mj-lt"/>
+                <a:buAutoNum type="arabicPeriod"/>
+              </a:pPr>
+              <a:r>
+                <a:rPr lang="ko-KR" altLang="en-US" sz="900" dirty="0">
+                  <a:solidFill>
+                    <a:schemeClr val="accent1">
+                      <a:lumMod val="60000"/>
+                      <a:lumOff val="40000"/>
+                    </a:schemeClr>
+                  </a:solidFill>
+                </a:rPr>
+                <a:t>삭제 시 </a:t>
+              </a:r>
+              <a:r>
+                <a:rPr lang="ko-KR" altLang="en-US" sz="900" dirty="0" err="1">
+                  <a:solidFill>
+                    <a:schemeClr val="accent1">
+                      <a:lumMod val="60000"/>
+                      <a:lumOff val="40000"/>
+                    </a:schemeClr>
+                  </a:solidFill>
+                </a:rPr>
+                <a:t>확인창</a:t>
+              </a:r>
+              <a:r>
+                <a:rPr lang="ko-KR" altLang="en-US" sz="900" dirty="0">
+                  <a:solidFill>
+                    <a:schemeClr val="accent1">
+                      <a:lumMod val="60000"/>
+                      <a:lumOff val="40000"/>
+                    </a:schemeClr>
+                  </a:solidFill>
+                </a:rPr>
+                <a:t> 필수</a:t>
+              </a:r>
+              <a:endParaRPr lang="en-US" altLang="ko-KR" sz="900" dirty="0">
+                <a:solidFill>
+                  <a:schemeClr val="accent1">
+                    <a:lumMod val="60000"/>
+                    <a:lumOff val="40000"/>
+                  </a:schemeClr>
+                </a:solidFill>
+              </a:endParaRPr>
+            </a:p>
+            <a:p>
+              <a:pPr marL="228600" indent="-228600">
+                <a:buFont typeface="+mj-lt"/>
+                <a:buAutoNum type="arabicPeriod"/>
+              </a:pPr>
+              <a:endParaRPr lang="en-US" altLang="ko-KR" sz="900" dirty="0">
+                <a:solidFill>
+                  <a:schemeClr val="accent1">
+                    <a:lumMod val="60000"/>
+                    <a:lumOff val="40000"/>
+                  </a:schemeClr>
+                </a:solidFill>
+              </a:endParaRPr>
+            </a:p>
+          </p:txBody>
+        </p:sp>
+      </p:grpSp>
+    </p:spTree>
+    <p:extLst>
+      <p:ext uri="{BB962C8B-B14F-4D97-AF65-F5344CB8AC3E}">
+        <p14:creationId xmlns:p14="http://schemas.microsoft.com/office/powerpoint/2010/main" val="4064326322"/>
+      </p:ext>
+    </p:extLst>
+  </p:cSld>
+  <p:clrMapOvr>
+    <a:masterClrMapping/>
+  </p:clrMapOvr>
+</p:sld>
+</file>
+
+<file path=ppt/slides/slide6.xml><?xml version="1.0" encoding="utf-8"?>
+<p:sld xmlns:a="http://schemas.openxmlformats.org/drawingml/2006/main" xmlns:r="http://schemas.openxmlformats.org/officeDocument/2006/relationships" xmlns:p="http://schemas.openxmlformats.org/presentationml/2006/main">
+  <p:cSld>
+    <p:spTree>
+      <p:nvGrpSpPr>
+        <p:cNvPr id="1" name=""/>
+        <p:cNvGrpSpPr/>
+        <p:nvPr/>
+      </p:nvGrpSpPr>
+      <p:grpSpPr>
+        <a:xfrm>
+          <a:off x="0" y="0"/>
+          <a:ext cx="0" cy="0"/>
+          <a:chOff x="0" y="0"/>
+          <a:chExt cx="0" cy="0"/>
+        </a:xfrm>
+      </p:grpSpPr>
+      <p:sp>
+        <p:nvSpPr>
           <p:cNvPr id="2" name="제목 1">
             <a:extLst>
               <a:ext uri="{FF2B5EF4-FFF2-40B4-BE49-F238E27FC236}">
@@ -10079,13 +11283,20 @@
             <p:ph type="title"/>
           </p:nvPr>
         </p:nvSpPr>
-        <p:spPr/>
+        <p:spPr>
+          <a:xfrm>
+            <a:off x="186351" y="167202"/>
+            <a:ext cx="9072000" cy="648000"/>
+          </a:xfrm>
+        </p:spPr>
         <p:txBody>
-          <a:bodyPr/>
+          <a:bodyPr>
+            <a:normAutofit/>
+          </a:bodyPr>
           <a:lstStyle/>
           <a:p>
             <a:r>
-              <a:rPr lang="ko-KR" altLang="en-US" dirty="0"/>
+              <a:rPr lang="ko-KR" altLang="en-US" sz="2400" dirty="0"/>
               <a:t>색상</a:t>
             </a:r>
           </a:p>
@@ -10113,7 +11324,7 @@
         </p:blipFill>
         <p:spPr>
           <a:xfrm>
-            <a:off x="0" y="1526781"/>
+            <a:off x="0" y="957175"/>
             <a:ext cx="12192000" cy="1975638"/>
           </a:xfrm>
           <a:prstGeom prst="rect">
@@ -10137,8 +11348,8 @@
         </p:nvSpPr>
         <p:spPr>
           <a:xfrm>
-            <a:off x="838200" y="3502419"/>
-            <a:ext cx="10515600" cy="1325563"/>
+            <a:off x="186351" y="3172286"/>
+            <a:ext cx="9072000" cy="648000"/>
           </a:xfrm>
           <a:prstGeom prst="rect">
             <a:avLst/>
@@ -10169,9 +11380,68 @@
           </a:lstStyle>
           <a:p>
             <a:r>
-              <a:rPr lang="ko-KR" altLang="en-US" dirty="0"/>
-              <a:t>로고</a:t>
-            </a:r>
+              <a:rPr lang="ko-KR" altLang="en-US" sz="2400" dirty="0"/>
+              <a:t>로고 </a:t>
+            </a:r>
+            <a:r>
+              <a:rPr lang="en-US" altLang="ko-KR" sz="2400" dirty="0"/>
+              <a:t>| favicon</a:t>
+            </a:r>
+            <a:endParaRPr lang="ko-KR" altLang="en-US" sz="2400" dirty="0"/>
+          </a:p>
+        </p:txBody>
+      </p:sp>
+      <p:sp>
+        <p:nvSpPr>
+          <p:cNvPr id="3" name="직사각형 2">
+            <a:extLst>
+              <a:ext uri="{FF2B5EF4-FFF2-40B4-BE49-F238E27FC236}">
+                <a16:creationId xmlns:a16="http://schemas.microsoft.com/office/drawing/2014/main" id="{7130EF12-2794-446C-CB39-AEC3B1D30A59}"/>
+              </a:ext>
+            </a:extLst>
+          </p:cNvPr>
+          <p:cNvSpPr/>
+          <p:nvPr/>
+        </p:nvSpPr>
+        <p:spPr>
+          <a:xfrm>
+            <a:off x="274799" y="3910564"/>
+            <a:ext cx="2631363" cy="1521515"/>
+          </a:xfrm>
+          <a:prstGeom prst="rect">
+            <a:avLst/>
+          </a:prstGeom>
+          <a:solidFill>
+            <a:schemeClr val="bg1">
+              <a:lumMod val="75000"/>
+            </a:schemeClr>
+          </a:solidFill>
+          <a:ln>
+            <a:noFill/>
+          </a:ln>
+        </p:spPr>
+        <p:style>
+          <a:lnRef idx="2">
+            <a:schemeClr val="accent1">
+              <a:shade val="15000"/>
+            </a:schemeClr>
+          </a:lnRef>
+          <a:fillRef idx="1">
+            <a:schemeClr val="accent1"/>
+          </a:fillRef>
+          <a:effectRef idx="0">
+            <a:schemeClr val="accent1"/>
+          </a:effectRef>
+          <a:fontRef idx="minor">
+            <a:schemeClr val="lt1"/>
+          </a:fontRef>
+        </p:style>
+        <p:txBody>
+          <a:bodyPr rtlCol="0" anchor="ctr"/>
+          <a:lstStyle/>
+          <a:p>
+            <a:pPr algn="ctr"/>
+            <a:endParaRPr lang="ko-KR" altLang="en-US"/>
           </a:p>
         </p:txBody>
       </p:sp>
@@ -10189,8 +11459,8 @@
         </p:nvSpPr>
         <p:spPr>
           <a:xfrm>
-            <a:off x="2718409" y="4956463"/>
-            <a:ext cx="789468" cy="528294"/>
+            <a:off x="535324" y="4118729"/>
+            <a:ext cx="1760459" cy="1178059"/>
           </a:xfrm>
           <a:custGeom>
             <a:avLst/>
@@ -11711,7 +12981,7 @@
             </a:pathLst>
           </a:custGeom>
           <a:solidFill>
-            <a:srgbClr val="E07A5F"/>
+            <a:schemeClr val="bg1"/>
           </a:solidFill>
           <a:ln w="9525" cap="flat">
             <a:noFill/>
@@ -11723,10 +12993,1650 @@
           <a:bodyPr rtlCol="0" anchor="ctr"/>
           <a:lstStyle/>
           <a:p>
-            <a:endParaRPr lang="ko-KR" altLang="en-US"/>
+            <a:endParaRPr lang="ko-KR" altLang="en-US" dirty="0"/>
           </a:p>
         </p:txBody>
       </p:sp>
+      <p:grpSp>
+        <p:nvGrpSpPr>
+          <p:cNvPr id="12" name="그룹 11">
+            <a:extLst>
+              <a:ext uri="{FF2B5EF4-FFF2-40B4-BE49-F238E27FC236}">
+                <a16:creationId xmlns:a16="http://schemas.microsoft.com/office/drawing/2014/main" id="{DDC68240-A669-31B7-DFA8-D3A2D3561442}"/>
+              </a:ext>
+            </a:extLst>
+          </p:cNvPr>
+          <p:cNvGrpSpPr/>
+          <p:nvPr/>
+        </p:nvGrpSpPr>
+        <p:grpSpPr>
+          <a:xfrm>
+            <a:off x="3656533" y="4131946"/>
+            <a:ext cx="1203225" cy="1164842"/>
+            <a:chOff x="4892775" y="4827982"/>
+            <a:chExt cx="631435" cy="611292"/>
+          </a:xfrm>
+        </p:grpSpPr>
+        <p:sp>
+          <p:nvSpPr>
+            <p:cNvPr id="8" name="직사각형 7">
+              <a:extLst>
+                <a:ext uri="{FF2B5EF4-FFF2-40B4-BE49-F238E27FC236}">
+                  <a16:creationId xmlns:a16="http://schemas.microsoft.com/office/drawing/2014/main" id="{E3D27DE9-66CA-E3C1-27F6-F51BA0B29CF1}"/>
+                </a:ext>
+              </a:extLst>
+            </p:cNvPr>
+            <p:cNvSpPr/>
+            <p:nvPr/>
+          </p:nvSpPr>
+          <p:spPr>
+            <a:xfrm rot="2700000">
+              <a:off x="4912918" y="4827982"/>
+              <a:ext cx="611292" cy="611292"/>
+            </a:xfrm>
+            <a:prstGeom prst="rect">
+              <a:avLst/>
+            </a:prstGeom>
+            <a:gradFill flip="none" rotWithShape="1">
+              <a:gsLst>
+                <a:gs pos="0">
+                  <a:srgbClr val="E07A5F"/>
+                </a:gs>
+                <a:gs pos="100000">
+                  <a:srgbClr val="81B29A"/>
+                </a:gs>
+                <a:gs pos="53000">
+                  <a:srgbClr val="F2CC8F"/>
+                </a:gs>
+              </a:gsLst>
+              <a:lin ang="0" scaled="1"/>
+              <a:tileRect/>
+            </a:gradFill>
+            <a:ln>
+              <a:noFill/>
+            </a:ln>
+            <a:effectLst>
+              <a:softEdge rad="0"/>
+            </a:effectLst>
+          </p:spPr>
+          <p:style>
+            <a:lnRef idx="2">
+              <a:schemeClr val="accent1">
+                <a:shade val="15000"/>
+              </a:schemeClr>
+            </a:lnRef>
+            <a:fillRef idx="1">
+              <a:schemeClr val="accent1"/>
+            </a:fillRef>
+            <a:effectRef idx="0">
+              <a:schemeClr val="accent1"/>
+            </a:effectRef>
+            <a:fontRef idx="minor">
+              <a:schemeClr val="lt1"/>
+            </a:fontRef>
+          </p:style>
+          <p:txBody>
+            <a:bodyPr rtlCol="0" anchor="ctr"/>
+            <a:lstStyle/>
+            <a:p>
+              <a:pPr algn="ctr"/>
+              <a:endParaRPr lang="ko-KR" altLang="en-US" dirty="0"/>
+            </a:p>
+          </p:txBody>
+        </p:sp>
+        <p:sp>
+          <p:nvSpPr>
+            <p:cNvPr id="9" name="그래픽 8" descr="동물 풍선 윤곽선">
+              <a:extLst>
+                <a:ext uri="{FF2B5EF4-FFF2-40B4-BE49-F238E27FC236}">
+                  <a16:creationId xmlns:a16="http://schemas.microsoft.com/office/drawing/2014/main" id="{6CEA2615-B75C-0A53-6003-2C12522792A5}"/>
+                </a:ext>
+              </a:extLst>
+            </p:cNvPr>
+            <p:cNvSpPr/>
+            <p:nvPr/>
+          </p:nvSpPr>
+          <p:spPr>
+            <a:xfrm>
+              <a:off x="4892775" y="4939773"/>
+              <a:ext cx="579383" cy="387710"/>
+            </a:xfrm>
+            <a:custGeom>
+              <a:avLst/>
+              <a:gdLst>
+                <a:gd name="connsiteX0" fmla="*/ 404936 w 789468"/>
+                <a:gd name="connsiteY0" fmla="*/ 239506 h 528294"/>
+                <a:gd name="connsiteX1" fmla="*/ 335556 w 789468"/>
+                <a:gd name="connsiteY1" fmla="*/ 266776 h 528294"/>
+                <a:gd name="connsiteX2" fmla="*/ 314439 w 789468"/>
+                <a:gd name="connsiteY2" fmla="*/ 235268 h 528294"/>
+                <a:gd name="connsiteX3" fmla="*/ 312353 w 789468"/>
+                <a:gd name="connsiteY3" fmla="*/ 233220 h 528294"/>
+                <a:gd name="connsiteX4" fmla="*/ 292351 w 789468"/>
+                <a:gd name="connsiteY4" fmla="*/ 217580 h 528294"/>
+                <a:gd name="connsiteX5" fmla="*/ 327279 w 789468"/>
+                <a:gd name="connsiteY5" fmla="*/ 193500 h 528294"/>
+                <a:gd name="connsiteX6" fmla="*/ 346329 w 789468"/>
+                <a:gd name="connsiteY6" fmla="*/ 174450 h 528294"/>
+                <a:gd name="connsiteX7" fmla="*/ 358997 w 789468"/>
+                <a:gd name="connsiteY7" fmla="*/ 66713 h 528294"/>
+                <a:gd name="connsiteX8" fmla="*/ 334804 w 789468"/>
+                <a:gd name="connsiteY8" fmla="*/ 51673 h 528294"/>
+                <a:gd name="connsiteX9" fmla="*/ 299256 w 789468"/>
+                <a:gd name="connsiteY9" fmla="*/ 5725 h 528294"/>
+                <a:gd name="connsiteX10" fmla="*/ 273310 w 789468"/>
+                <a:gd name="connsiteY10" fmla="*/ 0 h 528294"/>
+                <a:gd name="connsiteX11" fmla="*/ 201482 w 789468"/>
+                <a:gd name="connsiteY11" fmla="*/ 56083 h 528294"/>
+                <a:gd name="connsiteX12" fmla="*/ 190195 w 789468"/>
+                <a:gd name="connsiteY12" fmla="*/ 80848 h 528294"/>
+                <a:gd name="connsiteX13" fmla="*/ 182385 w 789468"/>
+                <a:gd name="connsiteY13" fmla="*/ 147523 h 528294"/>
+                <a:gd name="connsiteX14" fmla="*/ 147209 w 789468"/>
+                <a:gd name="connsiteY14" fmla="*/ 141637 h 528294"/>
+                <a:gd name="connsiteX15" fmla="*/ 145599 w 789468"/>
+                <a:gd name="connsiteY15" fmla="*/ 141637 h 528294"/>
+                <a:gd name="connsiteX16" fmla="*/ 144313 w 789468"/>
+                <a:gd name="connsiteY16" fmla="*/ 141637 h 528294"/>
+                <a:gd name="connsiteX17" fmla="*/ 62398 w 789468"/>
+                <a:gd name="connsiteY17" fmla="*/ 202825 h 528294"/>
+                <a:gd name="connsiteX18" fmla="*/ 9525 w 789468"/>
+                <a:gd name="connsiteY18" fmla="*/ 202825 h 528294"/>
+                <a:gd name="connsiteX19" fmla="*/ 0 w 789468"/>
+                <a:gd name="connsiteY19" fmla="*/ 212350 h 528294"/>
+                <a:gd name="connsiteX20" fmla="*/ 9525 w 789468"/>
+                <a:gd name="connsiteY20" fmla="*/ 221875 h 528294"/>
+                <a:gd name="connsiteX21" fmla="*/ 63922 w 789468"/>
+                <a:gd name="connsiteY21" fmla="*/ 221875 h 528294"/>
+                <a:gd name="connsiteX22" fmla="*/ 144323 w 789468"/>
+                <a:gd name="connsiteY22" fmla="*/ 272586 h 528294"/>
+                <a:gd name="connsiteX23" fmla="*/ 147999 w 789468"/>
+                <a:gd name="connsiteY23" fmla="*/ 272586 h 528294"/>
+                <a:gd name="connsiteX24" fmla="*/ 185147 w 789468"/>
+                <a:gd name="connsiteY24" fmla="*/ 265690 h 528294"/>
+                <a:gd name="connsiteX25" fmla="*/ 211398 w 789468"/>
+                <a:gd name="connsiteY25" fmla="*/ 334328 h 528294"/>
+                <a:gd name="connsiteX26" fmla="*/ 213303 w 789468"/>
+                <a:gd name="connsiteY26" fmla="*/ 336233 h 528294"/>
+                <a:gd name="connsiteX27" fmla="*/ 267795 w 789468"/>
+                <a:gd name="connsiteY27" fmla="*/ 362607 h 528294"/>
+                <a:gd name="connsiteX28" fmla="*/ 255118 w 789468"/>
+                <a:gd name="connsiteY28" fmla="*/ 386153 h 528294"/>
+                <a:gd name="connsiteX29" fmla="*/ 241535 w 789468"/>
+                <a:gd name="connsiteY29" fmla="*/ 419005 h 528294"/>
+                <a:gd name="connsiteX30" fmla="*/ 270434 w 789468"/>
+                <a:gd name="connsiteY30" fmla="*/ 521437 h 528294"/>
+                <a:gd name="connsiteX31" fmla="*/ 293637 w 789468"/>
+                <a:gd name="connsiteY31" fmla="*/ 526199 h 528294"/>
+                <a:gd name="connsiteX32" fmla="*/ 363388 w 789468"/>
+                <a:gd name="connsiteY32" fmla="*/ 469297 h 528294"/>
+                <a:gd name="connsiteX33" fmla="*/ 376923 w 789468"/>
+                <a:gd name="connsiteY33" fmla="*/ 436636 h 528294"/>
+                <a:gd name="connsiteX34" fmla="*/ 381791 w 789468"/>
+                <a:gd name="connsiteY34" fmla="*/ 368894 h 528294"/>
+                <a:gd name="connsiteX35" fmla="*/ 405032 w 789468"/>
+                <a:gd name="connsiteY35" fmla="*/ 371132 h 528294"/>
+                <a:gd name="connsiteX36" fmla="*/ 550393 w 789468"/>
+                <a:gd name="connsiteY36" fmla="*/ 371132 h 528294"/>
+                <a:gd name="connsiteX37" fmla="*/ 576682 w 789468"/>
+                <a:gd name="connsiteY37" fmla="*/ 368275 h 528294"/>
+                <a:gd name="connsiteX38" fmla="*/ 581863 w 789468"/>
+                <a:gd name="connsiteY38" fmla="*/ 436855 h 528294"/>
+                <a:gd name="connsiteX39" fmla="*/ 595694 w 789468"/>
+                <a:gd name="connsiteY39" fmla="*/ 470192 h 528294"/>
+                <a:gd name="connsiteX40" fmla="*/ 666950 w 789468"/>
+                <a:gd name="connsiteY40" fmla="*/ 528295 h 528294"/>
+                <a:gd name="connsiteX41" fmla="*/ 690648 w 789468"/>
+                <a:gd name="connsiteY41" fmla="*/ 523456 h 528294"/>
+                <a:gd name="connsiteX42" fmla="*/ 720176 w 789468"/>
+                <a:gd name="connsiteY42" fmla="*/ 418814 h 528294"/>
+                <a:gd name="connsiteX43" fmla="*/ 706307 w 789468"/>
+                <a:gd name="connsiteY43" fmla="*/ 385248 h 528294"/>
+                <a:gd name="connsiteX44" fmla="*/ 685124 w 789468"/>
+                <a:gd name="connsiteY44" fmla="*/ 350958 h 528294"/>
+                <a:gd name="connsiteX45" fmla="*/ 746636 w 789468"/>
+                <a:gd name="connsiteY45" fmla="*/ 290055 h 528294"/>
+                <a:gd name="connsiteX46" fmla="*/ 778840 w 789468"/>
+                <a:gd name="connsiteY46" fmla="*/ 212312 h 528294"/>
+                <a:gd name="connsiteX47" fmla="*/ 762019 w 789468"/>
+                <a:gd name="connsiteY47" fmla="*/ 110252 h 528294"/>
+                <a:gd name="connsiteX48" fmla="*/ 783755 w 789468"/>
+                <a:gd name="connsiteY48" fmla="*/ 57769 h 528294"/>
+                <a:gd name="connsiteX49" fmla="*/ 778963 w 789468"/>
+                <a:gd name="connsiteY49" fmla="*/ 45180 h 528294"/>
+                <a:gd name="connsiteX50" fmla="*/ 766374 w 789468"/>
+                <a:gd name="connsiteY50" fmla="*/ 49972 h 528294"/>
+                <a:gd name="connsiteX51" fmla="*/ 766162 w 789468"/>
+                <a:gd name="connsiteY51" fmla="*/ 50482 h 528294"/>
+                <a:gd name="connsiteX52" fmla="*/ 744579 w 789468"/>
+                <a:gd name="connsiteY52" fmla="*/ 102584 h 528294"/>
+                <a:gd name="connsiteX53" fmla="*/ 729005 w 789468"/>
+                <a:gd name="connsiteY53" fmla="*/ 100346 h 528294"/>
+                <a:gd name="connsiteX54" fmla="*/ 657901 w 789468"/>
+                <a:gd name="connsiteY54" fmla="*/ 162258 h 528294"/>
+                <a:gd name="connsiteX55" fmla="*/ 625697 w 789468"/>
+                <a:gd name="connsiteY55" fmla="*/ 240030 h 528294"/>
+                <a:gd name="connsiteX56" fmla="*/ 617830 w 789468"/>
+                <a:gd name="connsiteY56" fmla="*/ 264795 h 528294"/>
+                <a:gd name="connsiteX57" fmla="*/ 550393 w 789468"/>
+                <a:gd name="connsiteY57" fmla="*/ 239516 h 528294"/>
+                <a:gd name="connsiteX58" fmla="*/ 404936 w 789468"/>
+                <a:gd name="connsiteY58" fmla="*/ 239516 h 528294"/>
+                <a:gd name="connsiteX59" fmla="*/ 405041 w 789468"/>
+                <a:gd name="connsiteY59" fmla="*/ 258556 h 528294"/>
+                <a:gd name="connsiteX60" fmla="*/ 550393 w 789468"/>
+                <a:gd name="connsiteY60" fmla="*/ 258556 h 528294"/>
+                <a:gd name="connsiteX61" fmla="*/ 614686 w 789468"/>
+                <a:gd name="connsiteY61" fmla="*/ 305305 h 528294"/>
+                <a:gd name="connsiteX62" fmla="*/ 550393 w 789468"/>
+                <a:gd name="connsiteY62" fmla="*/ 352054 h 528294"/>
+                <a:gd name="connsiteX63" fmla="*/ 405051 w 789468"/>
+                <a:gd name="connsiteY63" fmla="*/ 352054 h 528294"/>
+                <a:gd name="connsiteX64" fmla="*/ 361331 w 789468"/>
+                <a:gd name="connsiteY64" fmla="*/ 341033 h 528294"/>
+                <a:gd name="connsiteX65" fmla="*/ 359216 w 789468"/>
+                <a:gd name="connsiteY65" fmla="*/ 339604 h 528294"/>
+                <a:gd name="connsiteX66" fmla="*/ 340757 w 789468"/>
+                <a:gd name="connsiteY66" fmla="*/ 305314 h 528294"/>
+                <a:gd name="connsiteX67" fmla="*/ 405041 w 789468"/>
+                <a:gd name="connsiteY67" fmla="*/ 258556 h 528294"/>
+                <a:gd name="connsiteX68" fmla="*/ 357568 w 789468"/>
+                <a:gd name="connsiteY68" fmla="*/ 115910 h 528294"/>
+                <a:gd name="connsiteX69" fmla="*/ 332804 w 789468"/>
+                <a:gd name="connsiteY69" fmla="*/ 161011 h 528294"/>
+                <a:gd name="connsiteX70" fmla="*/ 318516 w 789468"/>
+                <a:gd name="connsiteY70" fmla="*/ 175298 h 528294"/>
+                <a:gd name="connsiteX71" fmla="*/ 313754 w 789468"/>
+                <a:gd name="connsiteY71" fmla="*/ 180061 h 528294"/>
+                <a:gd name="connsiteX72" fmla="*/ 262509 w 789468"/>
+                <a:gd name="connsiteY72" fmla="*/ 205102 h 528294"/>
+                <a:gd name="connsiteX73" fmla="*/ 232982 w 789468"/>
+                <a:gd name="connsiteY73" fmla="*/ 192719 h 528294"/>
+                <a:gd name="connsiteX74" fmla="*/ 245659 w 789468"/>
+                <a:gd name="connsiteY74" fmla="*/ 111928 h 528294"/>
+                <a:gd name="connsiteX75" fmla="*/ 255184 w 789468"/>
+                <a:gd name="connsiteY75" fmla="*/ 102403 h 528294"/>
+                <a:gd name="connsiteX76" fmla="*/ 264709 w 789468"/>
+                <a:gd name="connsiteY76" fmla="*/ 92878 h 528294"/>
+                <a:gd name="connsiteX77" fmla="*/ 315859 w 789468"/>
+                <a:gd name="connsiteY77" fmla="*/ 67713 h 528294"/>
+                <a:gd name="connsiteX78" fmla="*/ 357975 w 789468"/>
+                <a:gd name="connsiteY78" fmla="*/ 110839 h 528294"/>
+                <a:gd name="connsiteX79" fmla="*/ 357616 w 789468"/>
+                <a:gd name="connsiteY79" fmla="*/ 115881 h 528294"/>
+                <a:gd name="connsiteX80" fmla="*/ 207540 w 789468"/>
+                <a:gd name="connsiteY80" fmla="*/ 88763 h 528294"/>
+                <a:gd name="connsiteX81" fmla="*/ 213179 w 789468"/>
+                <a:gd name="connsiteY81" fmla="*/ 76381 h 528294"/>
+                <a:gd name="connsiteX82" fmla="*/ 218818 w 789468"/>
+                <a:gd name="connsiteY82" fmla="*/ 63998 h 528294"/>
+                <a:gd name="connsiteX83" fmla="*/ 273320 w 789468"/>
+                <a:gd name="connsiteY83" fmla="*/ 19050 h 528294"/>
+                <a:gd name="connsiteX84" fmla="*/ 291294 w 789468"/>
+                <a:gd name="connsiteY84" fmla="*/ 23117 h 528294"/>
+                <a:gd name="connsiteX85" fmla="*/ 314154 w 789468"/>
+                <a:gd name="connsiteY85" fmla="*/ 48835 h 528294"/>
+                <a:gd name="connsiteX86" fmla="*/ 251155 w 789468"/>
+                <a:gd name="connsiteY86" fmla="*/ 79467 h 528294"/>
+                <a:gd name="connsiteX87" fmla="*/ 232105 w 789468"/>
+                <a:gd name="connsiteY87" fmla="*/ 98517 h 528294"/>
+                <a:gd name="connsiteX88" fmla="*/ 203025 w 789468"/>
+                <a:gd name="connsiteY88" fmla="*/ 148914 h 528294"/>
+                <a:gd name="connsiteX89" fmla="*/ 200054 w 789468"/>
+                <a:gd name="connsiteY89" fmla="*/ 140522 h 528294"/>
+                <a:gd name="connsiteX90" fmla="*/ 207540 w 789468"/>
+                <a:gd name="connsiteY90" fmla="*/ 88763 h 528294"/>
+                <a:gd name="connsiteX91" fmla="*/ 146533 w 789468"/>
+                <a:gd name="connsiteY91" fmla="*/ 253555 h 528294"/>
+                <a:gd name="connsiteX92" fmla="*/ 143132 w 789468"/>
+                <a:gd name="connsiteY92" fmla="*/ 253555 h 528294"/>
+                <a:gd name="connsiteX93" fmla="*/ 81696 w 789468"/>
+                <a:gd name="connsiteY93" fmla="*/ 213455 h 528294"/>
+                <a:gd name="connsiteX94" fmla="*/ 81305 w 789468"/>
+                <a:gd name="connsiteY94" fmla="*/ 209788 h 528294"/>
+                <a:gd name="connsiteX95" fmla="*/ 81229 w 789468"/>
+                <a:gd name="connsiteY95" fmla="*/ 207140 h 528294"/>
+                <a:gd name="connsiteX96" fmla="*/ 142980 w 789468"/>
+                <a:gd name="connsiteY96" fmla="*/ 160725 h 528294"/>
+                <a:gd name="connsiteX97" fmla="*/ 144323 w 789468"/>
+                <a:gd name="connsiteY97" fmla="*/ 160725 h 528294"/>
+                <a:gd name="connsiteX98" fmla="*/ 146780 w 789468"/>
+                <a:gd name="connsiteY98" fmla="*/ 160649 h 528294"/>
+                <a:gd name="connsiteX99" fmla="*/ 146780 w 789468"/>
+                <a:gd name="connsiteY99" fmla="*/ 160696 h 528294"/>
+                <a:gd name="connsiteX100" fmla="*/ 209017 w 789468"/>
+                <a:gd name="connsiteY100" fmla="*/ 207102 h 528294"/>
+                <a:gd name="connsiteX101" fmla="*/ 201397 w 789468"/>
+                <a:gd name="connsiteY101" fmla="*/ 231172 h 528294"/>
+                <a:gd name="connsiteX102" fmla="*/ 198806 w 789468"/>
+                <a:gd name="connsiteY102" fmla="*/ 234296 h 528294"/>
+                <a:gd name="connsiteX103" fmla="*/ 146533 w 789468"/>
+                <a:gd name="connsiteY103" fmla="*/ 253555 h 528294"/>
+                <a:gd name="connsiteX104" fmla="*/ 224847 w 789468"/>
+                <a:gd name="connsiteY104" fmla="*/ 320878 h 528294"/>
+                <a:gd name="connsiteX105" fmla="*/ 203521 w 789468"/>
+                <a:gd name="connsiteY105" fmla="*/ 275406 h 528294"/>
+                <a:gd name="connsiteX106" fmla="*/ 253346 w 789468"/>
+                <a:gd name="connsiteY106" fmla="*/ 225390 h 528294"/>
+                <a:gd name="connsiteX107" fmla="*/ 299371 w 789468"/>
+                <a:gd name="connsiteY107" fmla="*/ 247069 h 528294"/>
+                <a:gd name="connsiteX108" fmla="*/ 300114 w 789468"/>
+                <a:gd name="connsiteY108" fmla="*/ 247821 h 528294"/>
+                <a:gd name="connsiteX109" fmla="*/ 300961 w 789468"/>
+                <a:gd name="connsiteY109" fmla="*/ 248707 h 528294"/>
+                <a:gd name="connsiteX110" fmla="*/ 306867 w 789468"/>
+                <a:gd name="connsiteY110" fmla="*/ 328717 h 528294"/>
+                <a:gd name="connsiteX111" fmla="*/ 299066 w 789468"/>
+                <a:gd name="connsiteY111" fmla="*/ 335261 h 528294"/>
+                <a:gd name="connsiteX112" fmla="*/ 291446 w 789468"/>
+                <a:gd name="connsiteY112" fmla="*/ 339509 h 528294"/>
+                <a:gd name="connsiteX113" fmla="*/ 272082 w 789468"/>
+                <a:gd name="connsiteY113" fmla="*/ 343843 h 528294"/>
+                <a:gd name="connsiteX114" fmla="*/ 226771 w 789468"/>
+                <a:gd name="connsiteY114" fmla="*/ 322764 h 528294"/>
+                <a:gd name="connsiteX115" fmla="*/ 224809 w 789468"/>
+                <a:gd name="connsiteY115" fmla="*/ 320878 h 528294"/>
+                <a:gd name="connsiteX116" fmla="*/ 363226 w 789468"/>
+                <a:gd name="connsiteY116" fmla="*/ 373447 h 528294"/>
+                <a:gd name="connsiteX117" fmla="*/ 359416 w 789468"/>
+                <a:gd name="connsiteY117" fmla="*/ 429206 h 528294"/>
+                <a:gd name="connsiteX118" fmla="*/ 345767 w 789468"/>
+                <a:gd name="connsiteY118" fmla="*/ 462115 h 528294"/>
+                <a:gd name="connsiteX119" fmla="*/ 293675 w 789468"/>
+                <a:gd name="connsiteY119" fmla="*/ 507130 h 528294"/>
+                <a:gd name="connsiteX120" fmla="*/ 277759 w 789468"/>
+                <a:gd name="connsiteY120" fmla="*/ 503844 h 528294"/>
+                <a:gd name="connsiteX121" fmla="*/ 255413 w 789468"/>
+                <a:gd name="connsiteY121" fmla="*/ 481574 h 528294"/>
+                <a:gd name="connsiteX122" fmla="*/ 259109 w 789468"/>
+                <a:gd name="connsiteY122" fmla="*/ 426434 h 528294"/>
+                <a:gd name="connsiteX123" fmla="*/ 272806 w 789468"/>
+                <a:gd name="connsiteY123" fmla="*/ 393316 h 528294"/>
+                <a:gd name="connsiteX124" fmla="*/ 300428 w 789468"/>
+                <a:gd name="connsiteY124" fmla="*/ 356349 h 528294"/>
+                <a:gd name="connsiteX125" fmla="*/ 309363 w 789468"/>
+                <a:gd name="connsiteY125" fmla="*/ 351273 h 528294"/>
+                <a:gd name="connsiteX126" fmla="*/ 325041 w 789468"/>
+                <a:gd name="connsiteY126" fmla="*/ 347967 h 528294"/>
+                <a:gd name="connsiteX127" fmla="*/ 340928 w 789468"/>
+                <a:gd name="connsiteY127" fmla="*/ 351253 h 528294"/>
+                <a:gd name="connsiteX128" fmla="*/ 347520 w 789468"/>
+                <a:gd name="connsiteY128" fmla="*/ 354721 h 528294"/>
+                <a:gd name="connsiteX129" fmla="*/ 349425 w 789468"/>
+                <a:gd name="connsiteY129" fmla="*/ 356054 h 528294"/>
+                <a:gd name="connsiteX130" fmla="*/ 363226 w 789468"/>
+                <a:gd name="connsiteY130" fmla="*/ 373447 h 528294"/>
+                <a:gd name="connsiteX131" fmla="*/ 702640 w 789468"/>
+                <a:gd name="connsiteY131" fmla="*/ 426244 h 528294"/>
+                <a:gd name="connsiteX132" fmla="*/ 706450 w 789468"/>
+                <a:gd name="connsiteY132" fmla="*/ 482898 h 528294"/>
+                <a:gd name="connsiteX133" fmla="*/ 683390 w 789468"/>
+                <a:gd name="connsiteY133" fmla="*/ 505863 h 528294"/>
+                <a:gd name="connsiteX134" fmla="*/ 666988 w 789468"/>
+                <a:gd name="connsiteY134" fmla="*/ 509254 h 528294"/>
+                <a:gd name="connsiteX135" fmla="*/ 613381 w 789468"/>
+                <a:gd name="connsiteY135" fmla="*/ 463010 h 528294"/>
+                <a:gd name="connsiteX136" fmla="*/ 599446 w 789468"/>
+                <a:gd name="connsiteY136" fmla="*/ 429397 h 528294"/>
+                <a:gd name="connsiteX137" fmla="*/ 595532 w 789468"/>
+                <a:gd name="connsiteY137" fmla="*/ 372123 h 528294"/>
+                <a:gd name="connsiteX138" fmla="*/ 618515 w 789468"/>
+                <a:gd name="connsiteY138" fmla="*/ 349263 h 528294"/>
+                <a:gd name="connsiteX139" fmla="*/ 634908 w 789468"/>
+                <a:gd name="connsiteY139" fmla="*/ 345881 h 528294"/>
+                <a:gd name="connsiteX140" fmla="*/ 688677 w 789468"/>
+                <a:gd name="connsiteY140" fmla="*/ 392449 h 528294"/>
+                <a:gd name="connsiteX141" fmla="*/ 702640 w 789468"/>
+                <a:gd name="connsiteY141" fmla="*/ 426244 h 528294"/>
+                <a:gd name="connsiteX142" fmla="*/ 761248 w 789468"/>
+                <a:gd name="connsiteY142" fmla="*/ 205016 h 528294"/>
+                <a:gd name="connsiteX143" fmla="*/ 734349 w 789468"/>
+                <a:gd name="connsiteY143" fmla="*/ 269977 h 528294"/>
+                <a:gd name="connsiteX144" fmla="*/ 729044 w 789468"/>
+                <a:gd name="connsiteY144" fmla="*/ 282788 h 528294"/>
+                <a:gd name="connsiteX145" fmla="*/ 675332 w 789468"/>
+                <a:gd name="connsiteY145" fmla="*/ 332861 h 528294"/>
+                <a:gd name="connsiteX146" fmla="*/ 659463 w 789468"/>
+                <a:gd name="connsiteY146" fmla="*/ 329498 h 528294"/>
+                <a:gd name="connsiteX147" fmla="*/ 635527 w 789468"/>
+                <a:gd name="connsiteY147" fmla="*/ 301085 h 528294"/>
+                <a:gd name="connsiteX148" fmla="*/ 643299 w 789468"/>
+                <a:gd name="connsiteY148" fmla="*/ 247269 h 528294"/>
+                <a:gd name="connsiteX149" fmla="*/ 675504 w 789468"/>
+                <a:gd name="connsiteY149" fmla="*/ 169545 h 528294"/>
+                <a:gd name="connsiteX150" fmla="*/ 729015 w 789468"/>
+                <a:gd name="connsiteY150" fmla="*/ 119415 h 528294"/>
+                <a:gd name="connsiteX151" fmla="*/ 743903 w 789468"/>
+                <a:gd name="connsiteY151" fmla="*/ 122463 h 528294"/>
+                <a:gd name="connsiteX152" fmla="*/ 746065 w 789468"/>
+                <a:gd name="connsiteY152" fmla="*/ 123911 h 528294"/>
+                <a:gd name="connsiteX153" fmla="*/ 747665 w 789468"/>
+                <a:gd name="connsiteY153" fmla="*/ 124235 h 528294"/>
+                <a:gd name="connsiteX154" fmla="*/ 769087 w 789468"/>
+                <a:gd name="connsiteY154" fmla="*/ 151143 h 528294"/>
+                <a:gd name="connsiteX155" fmla="*/ 761248 w 789468"/>
+                <a:gd name="connsiteY155" fmla="*/ 205016 h 528294"/>
+              </a:gdLst>
+              <a:ahLst/>
+              <a:cxnLst>
+                <a:cxn ang="0">
+                  <a:pos x="connsiteX0" y="connsiteY0"/>
+                </a:cxn>
+                <a:cxn ang="0">
+                  <a:pos x="connsiteX1" y="connsiteY1"/>
+                </a:cxn>
+                <a:cxn ang="0">
+                  <a:pos x="connsiteX2" y="connsiteY2"/>
+                </a:cxn>
+                <a:cxn ang="0">
+                  <a:pos x="connsiteX3" y="connsiteY3"/>
+                </a:cxn>
+                <a:cxn ang="0">
+                  <a:pos x="connsiteX4" y="connsiteY4"/>
+                </a:cxn>
+                <a:cxn ang="0">
+                  <a:pos x="connsiteX5" y="connsiteY5"/>
+                </a:cxn>
+                <a:cxn ang="0">
+                  <a:pos x="connsiteX6" y="connsiteY6"/>
+                </a:cxn>
+                <a:cxn ang="0">
+                  <a:pos x="connsiteX7" y="connsiteY7"/>
+                </a:cxn>
+                <a:cxn ang="0">
+                  <a:pos x="connsiteX8" y="connsiteY8"/>
+                </a:cxn>
+                <a:cxn ang="0">
+                  <a:pos x="connsiteX9" y="connsiteY9"/>
+                </a:cxn>
+                <a:cxn ang="0">
+                  <a:pos x="connsiteX10" y="connsiteY10"/>
+                </a:cxn>
+                <a:cxn ang="0">
+                  <a:pos x="connsiteX11" y="connsiteY11"/>
+                </a:cxn>
+                <a:cxn ang="0">
+                  <a:pos x="connsiteX12" y="connsiteY12"/>
+                </a:cxn>
+                <a:cxn ang="0">
+                  <a:pos x="connsiteX13" y="connsiteY13"/>
+                </a:cxn>
+                <a:cxn ang="0">
+                  <a:pos x="connsiteX14" y="connsiteY14"/>
+                </a:cxn>
+                <a:cxn ang="0">
+                  <a:pos x="connsiteX15" y="connsiteY15"/>
+                </a:cxn>
+                <a:cxn ang="0">
+                  <a:pos x="connsiteX16" y="connsiteY16"/>
+                </a:cxn>
+                <a:cxn ang="0">
+                  <a:pos x="connsiteX17" y="connsiteY17"/>
+                </a:cxn>
+                <a:cxn ang="0">
+                  <a:pos x="connsiteX18" y="connsiteY18"/>
+                </a:cxn>
+                <a:cxn ang="0">
+                  <a:pos x="connsiteX19" y="connsiteY19"/>
+                </a:cxn>
+                <a:cxn ang="0">
+                  <a:pos x="connsiteX20" y="connsiteY20"/>
+                </a:cxn>
+                <a:cxn ang="0">
+                  <a:pos x="connsiteX21" y="connsiteY21"/>
+                </a:cxn>
+                <a:cxn ang="0">
+                  <a:pos x="connsiteX22" y="connsiteY22"/>
+                </a:cxn>
+                <a:cxn ang="0">
+                  <a:pos x="connsiteX23" y="connsiteY23"/>
+                </a:cxn>
+                <a:cxn ang="0">
+                  <a:pos x="connsiteX24" y="connsiteY24"/>
+                </a:cxn>
+                <a:cxn ang="0">
+                  <a:pos x="connsiteX25" y="connsiteY25"/>
+                </a:cxn>
+                <a:cxn ang="0">
+                  <a:pos x="connsiteX26" y="connsiteY26"/>
+                </a:cxn>
+                <a:cxn ang="0">
+                  <a:pos x="connsiteX27" y="connsiteY27"/>
+                </a:cxn>
+                <a:cxn ang="0">
+                  <a:pos x="connsiteX28" y="connsiteY28"/>
+                </a:cxn>
+                <a:cxn ang="0">
+                  <a:pos x="connsiteX29" y="connsiteY29"/>
+                </a:cxn>
+                <a:cxn ang="0">
+                  <a:pos x="connsiteX30" y="connsiteY30"/>
+                </a:cxn>
+                <a:cxn ang="0">
+                  <a:pos x="connsiteX31" y="connsiteY31"/>
+                </a:cxn>
+                <a:cxn ang="0">
+                  <a:pos x="connsiteX32" y="connsiteY32"/>
+                </a:cxn>
+                <a:cxn ang="0">
+                  <a:pos x="connsiteX33" y="connsiteY33"/>
+                </a:cxn>
+                <a:cxn ang="0">
+                  <a:pos x="connsiteX34" y="connsiteY34"/>
+                </a:cxn>
+                <a:cxn ang="0">
+                  <a:pos x="connsiteX35" y="connsiteY35"/>
+                </a:cxn>
+                <a:cxn ang="0">
+                  <a:pos x="connsiteX36" y="connsiteY36"/>
+                </a:cxn>
+                <a:cxn ang="0">
+                  <a:pos x="connsiteX37" y="connsiteY37"/>
+                </a:cxn>
+                <a:cxn ang="0">
+                  <a:pos x="connsiteX38" y="connsiteY38"/>
+                </a:cxn>
+                <a:cxn ang="0">
+                  <a:pos x="connsiteX39" y="connsiteY39"/>
+                </a:cxn>
+                <a:cxn ang="0">
+                  <a:pos x="connsiteX40" y="connsiteY40"/>
+                </a:cxn>
+                <a:cxn ang="0">
+                  <a:pos x="connsiteX41" y="connsiteY41"/>
+                </a:cxn>
+                <a:cxn ang="0">
+                  <a:pos x="connsiteX42" y="connsiteY42"/>
+                </a:cxn>
+                <a:cxn ang="0">
+                  <a:pos x="connsiteX43" y="connsiteY43"/>
+                </a:cxn>
+                <a:cxn ang="0">
+                  <a:pos x="connsiteX44" y="connsiteY44"/>
+                </a:cxn>
+                <a:cxn ang="0">
+                  <a:pos x="connsiteX45" y="connsiteY45"/>
+                </a:cxn>
+                <a:cxn ang="0">
+                  <a:pos x="connsiteX46" y="connsiteY46"/>
+                </a:cxn>
+                <a:cxn ang="0">
+                  <a:pos x="connsiteX47" y="connsiteY47"/>
+                </a:cxn>
+                <a:cxn ang="0">
+                  <a:pos x="connsiteX48" y="connsiteY48"/>
+                </a:cxn>
+                <a:cxn ang="0">
+                  <a:pos x="connsiteX49" y="connsiteY49"/>
+                </a:cxn>
+                <a:cxn ang="0">
+                  <a:pos x="connsiteX50" y="connsiteY50"/>
+                </a:cxn>
+                <a:cxn ang="0">
+                  <a:pos x="connsiteX51" y="connsiteY51"/>
+                </a:cxn>
+                <a:cxn ang="0">
+                  <a:pos x="connsiteX52" y="connsiteY52"/>
+                </a:cxn>
+                <a:cxn ang="0">
+                  <a:pos x="connsiteX53" y="connsiteY53"/>
+                </a:cxn>
+                <a:cxn ang="0">
+                  <a:pos x="connsiteX54" y="connsiteY54"/>
+                </a:cxn>
+                <a:cxn ang="0">
+                  <a:pos x="connsiteX55" y="connsiteY55"/>
+                </a:cxn>
+                <a:cxn ang="0">
+                  <a:pos x="connsiteX56" y="connsiteY56"/>
+                </a:cxn>
+                <a:cxn ang="0">
+                  <a:pos x="connsiteX57" y="connsiteY57"/>
+                </a:cxn>
+                <a:cxn ang="0">
+                  <a:pos x="connsiteX58" y="connsiteY58"/>
+                </a:cxn>
+                <a:cxn ang="0">
+                  <a:pos x="connsiteX59" y="connsiteY59"/>
+                </a:cxn>
+                <a:cxn ang="0">
+                  <a:pos x="connsiteX60" y="connsiteY60"/>
+                </a:cxn>
+                <a:cxn ang="0">
+                  <a:pos x="connsiteX61" y="connsiteY61"/>
+                </a:cxn>
+                <a:cxn ang="0">
+                  <a:pos x="connsiteX62" y="connsiteY62"/>
+                </a:cxn>
+                <a:cxn ang="0">
+                  <a:pos x="connsiteX63" y="connsiteY63"/>
+                </a:cxn>
+                <a:cxn ang="0">
+                  <a:pos x="connsiteX64" y="connsiteY64"/>
+                </a:cxn>
+                <a:cxn ang="0">
+                  <a:pos x="connsiteX65" y="connsiteY65"/>
+                </a:cxn>
+                <a:cxn ang="0">
+                  <a:pos x="connsiteX66" y="connsiteY66"/>
+                </a:cxn>
+                <a:cxn ang="0">
+                  <a:pos x="connsiteX67" y="connsiteY67"/>
+                </a:cxn>
+                <a:cxn ang="0">
+                  <a:pos x="connsiteX68" y="connsiteY68"/>
+                </a:cxn>
+                <a:cxn ang="0">
+                  <a:pos x="connsiteX69" y="connsiteY69"/>
+                </a:cxn>
+                <a:cxn ang="0">
+                  <a:pos x="connsiteX70" y="connsiteY70"/>
+                </a:cxn>
+                <a:cxn ang="0">
+                  <a:pos x="connsiteX71" y="connsiteY71"/>
+                </a:cxn>
+                <a:cxn ang="0">
+                  <a:pos x="connsiteX72" y="connsiteY72"/>
+                </a:cxn>
+                <a:cxn ang="0">
+                  <a:pos x="connsiteX73" y="connsiteY73"/>
+                </a:cxn>
+                <a:cxn ang="0">
+                  <a:pos x="connsiteX74" y="connsiteY74"/>
+                </a:cxn>
+                <a:cxn ang="0">
+                  <a:pos x="connsiteX75" y="connsiteY75"/>
+                </a:cxn>
+                <a:cxn ang="0">
+                  <a:pos x="connsiteX76" y="connsiteY76"/>
+                </a:cxn>
+                <a:cxn ang="0">
+                  <a:pos x="connsiteX77" y="connsiteY77"/>
+                </a:cxn>
+                <a:cxn ang="0">
+                  <a:pos x="connsiteX78" y="connsiteY78"/>
+                </a:cxn>
+                <a:cxn ang="0">
+                  <a:pos x="connsiteX79" y="connsiteY79"/>
+                </a:cxn>
+                <a:cxn ang="0">
+                  <a:pos x="connsiteX80" y="connsiteY80"/>
+                </a:cxn>
+                <a:cxn ang="0">
+                  <a:pos x="connsiteX81" y="connsiteY81"/>
+                </a:cxn>
+                <a:cxn ang="0">
+                  <a:pos x="connsiteX82" y="connsiteY82"/>
+                </a:cxn>
+                <a:cxn ang="0">
+                  <a:pos x="connsiteX83" y="connsiteY83"/>
+                </a:cxn>
+                <a:cxn ang="0">
+                  <a:pos x="connsiteX84" y="connsiteY84"/>
+                </a:cxn>
+                <a:cxn ang="0">
+                  <a:pos x="connsiteX85" y="connsiteY85"/>
+                </a:cxn>
+                <a:cxn ang="0">
+                  <a:pos x="connsiteX86" y="connsiteY86"/>
+                </a:cxn>
+                <a:cxn ang="0">
+                  <a:pos x="connsiteX87" y="connsiteY87"/>
+                </a:cxn>
+                <a:cxn ang="0">
+                  <a:pos x="connsiteX88" y="connsiteY88"/>
+                </a:cxn>
+                <a:cxn ang="0">
+                  <a:pos x="connsiteX89" y="connsiteY89"/>
+                </a:cxn>
+                <a:cxn ang="0">
+                  <a:pos x="connsiteX90" y="connsiteY90"/>
+                </a:cxn>
+                <a:cxn ang="0">
+                  <a:pos x="connsiteX91" y="connsiteY91"/>
+                </a:cxn>
+                <a:cxn ang="0">
+                  <a:pos x="connsiteX92" y="connsiteY92"/>
+                </a:cxn>
+                <a:cxn ang="0">
+                  <a:pos x="connsiteX93" y="connsiteY93"/>
+                </a:cxn>
+                <a:cxn ang="0">
+                  <a:pos x="connsiteX94" y="connsiteY94"/>
+                </a:cxn>
+                <a:cxn ang="0">
+                  <a:pos x="connsiteX95" y="connsiteY95"/>
+                </a:cxn>
+                <a:cxn ang="0">
+                  <a:pos x="connsiteX96" y="connsiteY96"/>
+                </a:cxn>
+                <a:cxn ang="0">
+                  <a:pos x="connsiteX97" y="connsiteY97"/>
+                </a:cxn>
+                <a:cxn ang="0">
+                  <a:pos x="connsiteX98" y="connsiteY98"/>
+                </a:cxn>
+                <a:cxn ang="0">
+                  <a:pos x="connsiteX99" y="connsiteY99"/>
+                </a:cxn>
+                <a:cxn ang="0">
+                  <a:pos x="connsiteX100" y="connsiteY100"/>
+                </a:cxn>
+                <a:cxn ang="0">
+                  <a:pos x="connsiteX101" y="connsiteY101"/>
+                </a:cxn>
+                <a:cxn ang="0">
+                  <a:pos x="connsiteX102" y="connsiteY102"/>
+                </a:cxn>
+                <a:cxn ang="0">
+                  <a:pos x="connsiteX103" y="connsiteY103"/>
+                </a:cxn>
+                <a:cxn ang="0">
+                  <a:pos x="connsiteX104" y="connsiteY104"/>
+                </a:cxn>
+                <a:cxn ang="0">
+                  <a:pos x="connsiteX105" y="connsiteY105"/>
+                </a:cxn>
+                <a:cxn ang="0">
+                  <a:pos x="connsiteX106" y="connsiteY106"/>
+                </a:cxn>
+                <a:cxn ang="0">
+                  <a:pos x="connsiteX107" y="connsiteY107"/>
+                </a:cxn>
+                <a:cxn ang="0">
+                  <a:pos x="connsiteX108" y="connsiteY108"/>
+                </a:cxn>
+                <a:cxn ang="0">
+                  <a:pos x="connsiteX109" y="connsiteY109"/>
+                </a:cxn>
+                <a:cxn ang="0">
+                  <a:pos x="connsiteX110" y="connsiteY110"/>
+                </a:cxn>
+                <a:cxn ang="0">
+                  <a:pos x="connsiteX111" y="connsiteY111"/>
+                </a:cxn>
+                <a:cxn ang="0">
+                  <a:pos x="connsiteX112" y="connsiteY112"/>
+                </a:cxn>
+                <a:cxn ang="0">
+                  <a:pos x="connsiteX113" y="connsiteY113"/>
+                </a:cxn>
+                <a:cxn ang="0">
+                  <a:pos x="connsiteX114" y="connsiteY114"/>
+                </a:cxn>
+                <a:cxn ang="0">
+                  <a:pos x="connsiteX115" y="connsiteY115"/>
+                </a:cxn>
+                <a:cxn ang="0">
+                  <a:pos x="connsiteX116" y="connsiteY116"/>
+                </a:cxn>
+                <a:cxn ang="0">
+                  <a:pos x="connsiteX117" y="connsiteY117"/>
+                </a:cxn>
+                <a:cxn ang="0">
+                  <a:pos x="connsiteX118" y="connsiteY118"/>
+                </a:cxn>
+                <a:cxn ang="0">
+                  <a:pos x="connsiteX119" y="connsiteY119"/>
+                </a:cxn>
+                <a:cxn ang="0">
+                  <a:pos x="connsiteX120" y="connsiteY120"/>
+                </a:cxn>
+                <a:cxn ang="0">
+                  <a:pos x="connsiteX121" y="connsiteY121"/>
+                </a:cxn>
+                <a:cxn ang="0">
+                  <a:pos x="connsiteX122" y="connsiteY122"/>
+                </a:cxn>
+                <a:cxn ang="0">
+                  <a:pos x="connsiteX123" y="connsiteY123"/>
+                </a:cxn>
+                <a:cxn ang="0">
+                  <a:pos x="connsiteX124" y="connsiteY124"/>
+                </a:cxn>
+                <a:cxn ang="0">
+                  <a:pos x="connsiteX125" y="connsiteY125"/>
+                </a:cxn>
+                <a:cxn ang="0">
+                  <a:pos x="connsiteX126" y="connsiteY126"/>
+                </a:cxn>
+                <a:cxn ang="0">
+                  <a:pos x="connsiteX127" y="connsiteY127"/>
+                </a:cxn>
+                <a:cxn ang="0">
+                  <a:pos x="connsiteX128" y="connsiteY128"/>
+                </a:cxn>
+                <a:cxn ang="0">
+                  <a:pos x="connsiteX129" y="connsiteY129"/>
+                </a:cxn>
+                <a:cxn ang="0">
+                  <a:pos x="connsiteX130" y="connsiteY130"/>
+                </a:cxn>
+                <a:cxn ang="0">
+                  <a:pos x="connsiteX131" y="connsiteY131"/>
+                </a:cxn>
+                <a:cxn ang="0">
+                  <a:pos x="connsiteX132" y="connsiteY132"/>
+                </a:cxn>
+                <a:cxn ang="0">
+                  <a:pos x="connsiteX133" y="connsiteY133"/>
+                </a:cxn>
+                <a:cxn ang="0">
+                  <a:pos x="connsiteX134" y="connsiteY134"/>
+                </a:cxn>
+                <a:cxn ang="0">
+                  <a:pos x="connsiteX135" y="connsiteY135"/>
+                </a:cxn>
+                <a:cxn ang="0">
+                  <a:pos x="connsiteX136" y="connsiteY136"/>
+                </a:cxn>
+                <a:cxn ang="0">
+                  <a:pos x="connsiteX137" y="connsiteY137"/>
+                </a:cxn>
+                <a:cxn ang="0">
+                  <a:pos x="connsiteX138" y="connsiteY138"/>
+                </a:cxn>
+                <a:cxn ang="0">
+                  <a:pos x="connsiteX139" y="connsiteY139"/>
+                </a:cxn>
+                <a:cxn ang="0">
+                  <a:pos x="connsiteX140" y="connsiteY140"/>
+                </a:cxn>
+                <a:cxn ang="0">
+                  <a:pos x="connsiteX141" y="connsiteY141"/>
+                </a:cxn>
+                <a:cxn ang="0">
+                  <a:pos x="connsiteX142" y="connsiteY142"/>
+                </a:cxn>
+                <a:cxn ang="0">
+                  <a:pos x="connsiteX143" y="connsiteY143"/>
+                </a:cxn>
+                <a:cxn ang="0">
+                  <a:pos x="connsiteX144" y="connsiteY144"/>
+                </a:cxn>
+                <a:cxn ang="0">
+                  <a:pos x="connsiteX145" y="connsiteY145"/>
+                </a:cxn>
+                <a:cxn ang="0">
+                  <a:pos x="connsiteX146" y="connsiteY146"/>
+                </a:cxn>
+                <a:cxn ang="0">
+                  <a:pos x="connsiteX147" y="connsiteY147"/>
+                </a:cxn>
+                <a:cxn ang="0">
+                  <a:pos x="connsiteX148" y="connsiteY148"/>
+                </a:cxn>
+                <a:cxn ang="0">
+                  <a:pos x="connsiteX149" y="connsiteY149"/>
+                </a:cxn>
+                <a:cxn ang="0">
+                  <a:pos x="connsiteX150" y="connsiteY150"/>
+                </a:cxn>
+                <a:cxn ang="0">
+                  <a:pos x="connsiteX151" y="connsiteY151"/>
+                </a:cxn>
+                <a:cxn ang="0">
+                  <a:pos x="connsiteX152" y="connsiteY152"/>
+                </a:cxn>
+                <a:cxn ang="0">
+                  <a:pos x="connsiteX153" y="connsiteY153"/>
+                </a:cxn>
+                <a:cxn ang="0">
+                  <a:pos x="connsiteX154" y="connsiteY154"/>
+                </a:cxn>
+                <a:cxn ang="0">
+                  <a:pos x="connsiteX155" y="connsiteY155"/>
+                </a:cxn>
+              </a:cxnLst>
+              <a:rect l="l" t="t" r="r" b="b"/>
+              <a:pathLst>
+                <a:path w="789468" h="528294">
+                  <a:moveTo>
+                    <a:pt x="404936" y="239506"/>
+                  </a:moveTo>
+                  <a:cubicBezTo>
+                    <a:pt x="374885" y="239506"/>
+                    <a:pt x="350053" y="249622"/>
+                    <a:pt x="335556" y="266776"/>
+                  </a:cubicBezTo>
+                  <a:cubicBezTo>
+                    <a:pt x="330708" y="254959"/>
+                    <a:pt x="323526" y="244243"/>
+                    <a:pt x="314439" y="235268"/>
+                  </a:cubicBezTo>
+                  <a:cubicBezTo>
+                    <a:pt x="314439" y="235268"/>
+                    <a:pt x="312410" y="233296"/>
+                    <a:pt x="312353" y="233220"/>
+                  </a:cubicBezTo>
+                  <a:cubicBezTo>
+                    <a:pt x="306358" y="227199"/>
+                    <a:pt x="299639" y="221945"/>
+                    <a:pt x="292351" y="217580"/>
+                  </a:cubicBezTo>
+                  <a:cubicBezTo>
+                    <a:pt x="305429" y="211866"/>
+                    <a:pt x="317286" y="203691"/>
+                    <a:pt x="327279" y="193500"/>
+                  </a:cubicBezTo>
+                  <a:cubicBezTo>
+                    <a:pt x="330441" y="190329"/>
+                    <a:pt x="343119" y="177651"/>
+                    <a:pt x="346329" y="174450"/>
+                  </a:cubicBezTo>
+                  <a:cubicBezTo>
+                    <a:pt x="381333" y="139494"/>
+                    <a:pt x="387668" y="95393"/>
+                    <a:pt x="358997" y="66713"/>
+                  </a:cubicBezTo>
+                  <a:cubicBezTo>
+                    <a:pt x="352236" y="59856"/>
+                    <a:pt x="343945" y="54701"/>
+                    <a:pt x="334804" y="51673"/>
+                  </a:cubicBezTo>
+                  <a:cubicBezTo>
+                    <a:pt x="331428" y="31357"/>
+                    <a:pt x="318073" y="14095"/>
+                    <a:pt x="299256" y="5725"/>
+                  </a:cubicBezTo>
+                  <a:cubicBezTo>
+                    <a:pt x="291121" y="1970"/>
+                    <a:pt x="282271" y="17"/>
+                    <a:pt x="273310" y="0"/>
+                  </a:cubicBezTo>
+                  <a:cubicBezTo>
+                    <a:pt x="244612" y="0"/>
+                    <a:pt x="217465" y="20955"/>
+                    <a:pt x="201482" y="56083"/>
+                  </a:cubicBezTo>
+                  <a:lnTo>
+                    <a:pt x="190195" y="80848"/>
+                  </a:lnTo>
+                  <a:cubicBezTo>
+                    <a:pt x="179873" y="101476"/>
+                    <a:pt x="177109" y="125069"/>
+                    <a:pt x="182385" y="147523"/>
+                  </a:cubicBezTo>
+                  <a:cubicBezTo>
+                    <a:pt x="171071" y="143610"/>
+                    <a:pt x="159181" y="141621"/>
+                    <a:pt x="147209" y="141637"/>
+                  </a:cubicBezTo>
+                  <a:cubicBezTo>
+                    <a:pt x="147066" y="141637"/>
+                    <a:pt x="146571" y="141637"/>
+                    <a:pt x="145599" y="141637"/>
+                  </a:cubicBezTo>
+                  <a:lnTo>
+                    <a:pt x="144313" y="141637"/>
+                  </a:lnTo>
+                  <a:cubicBezTo>
+                    <a:pt x="98393" y="141637"/>
+                    <a:pt x="64827" y="166002"/>
+                    <a:pt x="62398" y="202825"/>
+                  </a:cubicBezTo>
+                  <a:lnTo>
+                    <a:pt x="9525" y="202825"/>
+                  </a:lnTo>
+                  <a:cubicBezTo>
+                    <a:pt x="4265" y="202825"/>
+                    <a:pt x="0" y="207090"/>
+                    <a:pt x="0" y="212350"/>
+                  </a:cubicBezTo>
+                  <a:cubicBezTo>
+                    <a:pt x="0" y="217611"/>
+                    <a:pt x="4265" y="221875"/>
+                    <a:pt x="9525" y="221875"/>
+                  </a:cubicBezTo>
+                  <a:lnTo>
+                    <a:pt x="63922" y="221875"/>
+                  </a:lnTo>
+                  <a:cubicBezTo>
+                    <a:pt x="71476" y="252784"/>
+                    <a:pt x="102889" y="272586"/>
+                    <a:pt x="144323" y="272586"/>
+                  </a:cubicBezTo>
+                  <a:lnTo>
+                    <a:pt x="147999" y="272586"/>
+                  </a:lnTo>
+                  <a:cubicBezTo>
+                    <a:pt x="160695" y="272533"/>
+                    <a:pt x="173278" y="270197"/>
+                    <a:pt x="185147" y="265690"/>
+                  </a:cubicBezTo>
+                  <a:cubicBezTo>
+                    <a:pt x="182537" y="291435"/>
+                    <a:pt x="192275" y="316895"/>
+                    <a:pt x="211398" y="334328"/>
+                  </a:cubicBezTo>
+                  <a:cubicBezTo>
+                    <a:pt x="211846" y="334766"/>
+                    <a:pt x="213208" y="336137"/>
+                    <a:pt x="213303" y="336233"/>
+                  </a:cubicBezTo>
+                  <a:cubicBezTo>
+                    <a:pt x="227660" y="351353"/>
+                    <a:pt x="247030" y="360728"/>
+                    <a:pt x="267795" y="362607"/>
+                  </a:cubicBezTo>
+                  <a:cubicBezTo>
+                    <a:pt x="262690" y="369949"/>
+                    <a:pt x="258436" y="377849"/>
+                    <a:pt x="255118" y="386153"/>
+                  </a:cubicBezTo>
+                  <a:cubicBezTo>
+                    <a:pt x="253051" y="391230"/>
+                    <a:pt x="243688" y="413776"/>
+                    <a:pt x="241535" y="419005"/>
+                  </a:cubicBezTo>
+                  <a:cubicBezTo>
+                    <a:pt x="222723" y="463420"/>
+                    <a:pt x="233696" y="506225"/>
+                    <a:pt x="270434" y="521437"/>
+                  </a:cubicBezTo>
+                  <a:cubicBezTo>
+                    <a:pt x="277778" y="524542"/>
+                    <a:pt x="285663" y="526160"/>
+                    <a:pt x="293637" y="526199"/>
+                  </a:cubicBezTo>
+                  <a:cubicBezTo>
+                    <a:pt x="322317" y="526199"/>
+                    <a:pt x="349025" y="504711"/>
+                    <a:pt x="363388" y="469297"/>
+                  </a:cubicBezTo>
+                  <a:cubicBezTo>
+                    <a:pt x="365484" y="464115"/>
+                    <a:pt x="374818" y="441674"/>
+                    <a:pt x="376923" y="436636"/>
+                  </a:cubicBezTo>
+                  <a:cubicBezTo>
+                    <a:pt x="386946" y="415455"/>
+                    <a:pt x="388683" y="391290"/>
+                    <a:pt x="381791" y="368894"/>
+                  </a:cubicBezTo>
+                  <a:cubicBezTo>
+                    <a:pt x="389447" y="370388"/>
+                    <a:pt x="397231" y="371138"/>
+                    <a:pt x="405032" y="371132"/>
+                  </a:cubicBezTo>
+                  <a:lnTo>
+                    <a:pt x="550393" y="371132"/>
+                  </a:lnTo>
+                  <a:cubicBezTo>
+                    <a:pt x="559235" y="371166"/>
+                    <a:pt x="568053" y="370208"/>
+                    <a:pt x="576682" y="368275"/>
+                  </a:cubicBezTo>
+                  <a:cubicBezTo>
+                    <a:pt x="569900" y="390992"/>
+                    <a:pt x="571745" y="415414"/>
+                    <a:pt x="581863" y="436855"/>
+                  </a:cubicBezTo>
+                  <a:cubicBezTo>
+                    <a:pt x="584035" y="442008"/>
+                    <a:pt x="593550" y="464925"/>
+                    <a:pt x="595694" y="470192"/>
+                  </a:cubicBezTo>
+                  <a:cubicBezTo>
+                    <a:pt x="610362" y="506387"/>
+                    <a:pt x="637604" y="528295"/>
+                    <a:pt x="666950" y="528295"/>
+                  </a:cubicBezTo>
+                  <a:cubicBezTo>
+                    <a:pt x="675091" y="528257"/>
+                    <a:pt x="683144" y="526613"/>
+                    <a:pt x="690648" y="523456"/>
+                  </a:cubicBezTo>
+                  <a:cubicBezTo>
+                    <a:pt x="728177" y="507902"/>
+                    <a:pt x="739378" y="464182"/>
+                    <a:pt x="720176" y="418814"/>
+                  </a:cubicBezTo>
+                  <a:cubicBezTo>
+                    <a:pt x="717937" y="413509"/>
+                    <a:pt x="708412" y="390439"/>
+                    <a:pt x="706307" y="385248"/>
+                  </a:cubicBezTo>
+                  <a:cubicBezTo>
+                    <a:pt x="701347" y="372647"/>
+                    <a:pt x="694173" y="361034"/>
+                    <a:pt x="685124" y="350958"/>
+                  </a:cubicBezTo>
+                  <a:cubicBezTo>
+                    <a:pt x="710717" y="346281"/>
+                    <a:pt x="732749" y="323498"/>
+                    <a:pt x="746636" y="290055"/>
+                  </a:cubicBezTo>
+                  <a:lnTo>
+                    <a:pt x="778840" y="212312"/>
+                  </a:lnTo>
+                  <a:cubicBezTo>
+                    <a:pt x="796862" y="168916"/>
+                    <a:pt x="792423" y="129245"/>
+                    <a:pt x="762019" y="110252"/>
+                  </a:cubicBezTo>
+                  <a:lnTo>
+                    <a:pt x="783755" y="57769"/>
+                  </a:lnTo>
+                  <a:cubicBezTo>
+                    <a:pt x="785909" y="52969"/>
+                    <a:pt x="783763" y="47334"/>
+                    <a:pt x="778963" y="45180"/>
+                  </a:cubicBezTo>
+                  <a:cubicBezTo>
+                    <a:pt x="774163" y="43026"/>
+                    <a:pt x="768528" y="45172"/>
+                    <a:pt x="766374" y="49972"/>
+                  </a:cubicBezTo>
+                  <a:cubicBezTo>
+                    <a:pt x="766299" y="50140"/>
+                    <a:pt x="766228" y="50310"/>
+                    <a:pt x="766162" y="50482"/>
+                  </a:cubicBezTo>
+                  <a:lnTo>
+                    <a:pt x="744579" y="102584"/>
+                  </a:lnTo>
+                  <a:cubicBezTo>
+                    <a:pt x="739513" y="101136"/>
+                    <a:pt x="734274" y="100382"/>
+                    <a:pt x="729005" y="100346"/>
+                  </a:cubicBezTo>
+                  <a:cubicBezTo>
+                    <a:pt x="699421" y="100346"/>
+                    <a:pt x="673627" y="124263"/>
+                    <a:pt x="657901" y="162258"/>
+                  </a:cubicBezTo>
+                  <a:lnTo>
+                    <a:pt x="625697" y="240030"/>
+                  </a:lnTo>
+                  <a:cubicBezTo>
+                    <a:pt x="622353" y="248038"/>
+                    <a:pt x="619720" y="256325"/>
+                    <a:pt x="617830" y="264795"/>
+                  </a:cubicBezTo>
+                  <a:cubicBezTo>
+                    <a:pt x="599788" y="247446"/>
+                    <a:pt x="575393" y="238301"/>
+                    <a:pt x="550393" y="239516"/>
+                  </a:cubicBezTo>
+                  <a:lnTo>
+                    <a:pt x="404936" y="239516"/>
+                  </a:lnTo>
+                  <a:close/>
+                  <a:moveTo>
+                    <a:pt x="405041" y="258556"/>
+                  </a:moveTo>
+                  <a:lnTo>
+                    <a:pt x="550393" y="258556"/>
+                  </a:lnTo>
+                  <a:cubicBezTo>
+                    <a:pt x="582397" y="258556"/>
+                    <a:pt x="614686" y="273006"/>
+                    <a:pt x="614686" y="305305"/>
+                  </a:cubicBezTo>
+                  <a:cubicBezTo>
+                    <a:pt x="614686" y="337604"/>
+                    <a:pt x="582397" y="352054"/>
+                    <a:pt x="550393" y="352054"/>
+                  </a:cubicBezTo>
+                  <a:lnTo>
+                    <a:pt x="405051" y="352054"/>
+                  </a:lnTo>
+                  <a:cubicBezTo>
+                    <a:pt x="389748" y="352412"/>
+                    <a:pt x="374635" y="348603"/>
+                    <a:pt x="361331" y="341033"/>
+                  </a:cubicBezTo>
+                  <a:cubicBezTo>
+                    <a:pt x="360655" y="340528"/>
+                    <a:pt x="359921" y="340081"/>
+                    <a:pt x="359216" y="339604"/>
+                  </a:cubicBezTo>
+                  <a:cubicBezTo>
+                    <a:pt x="347559" y="332124"/>
+                    <a:pt x="340582" y="319164"/>
+                    <a:pt x="340757" y="305314"/>
+                  </a:cubicBezTo>
+                  <a:cubicBezTo>
+                    <a:pt x="340757" y="273015"/>
+                    <a:pt x="373094" y="258566"/>
+                    <a:pt x="405041" y="258556"/>
+                  </a:cubicBezTo>
+                  <a:close/>
+                  <a:moveTo>
+                    <a:pt x="357568" y="115910"/>
+                  </a:moveTo>
+                  <a:cubicBezTo>
+                    <a:pt x="354448" y="133240"/>
+                    <a:pt x="345753" y="149077"/>
+                    <a:pt x="332804" y="161011"/>
+                  </a:cubicBezTo>
+                  <a:lnTo>
+                    <a:pt x="318516" y="175298"/>
+                  </a:lnTo>
+                  <a:lnTo>
+                    <a:pt x="313754" y="180061"/>
+                  </a:lnTo>
+                  <a:cubicBezTo>
+                    <a:pt x="300546" y="194711"/>
+                    <a:pt x="282183" y="203685"/>
+                    <a:pt x="262509" y="205102"/>
+                  </a:cubicBezTo>
+                  <a:cubicBezTo>
+                    <a:pt x="251384" y="205206"/>
+                    <a:pt x="240705" y="200727"/>
+                    <a:pt x="232982" y="192719"/>
+                  </a:cubicBezTo>
+                  <a:cubicBezTo>
+                    <a:pt x="209455" y="169193"/>
+                    <a:pt x="222390" y="135188"/>
+                    <a:pt x="245659" y="111928"/>
+                  </a:cubicBezTo>
+                  <a:lnTo>
+                    <a:pt x="255184" y="102403"/>
+                  </a:lnTo>
+                  <a:lnTo>
+                    <a:pt x="264709" y="92878"/>
+                  </a:lnTo>
+                  <a:cubicBezTo>
+                    <a:pt x="277811" y="78122"/>
+                    <a:pt x="296173" y="69088"/>
+                    <a:pt x="315859" y="67713"/>
+                  </a:cubicBezTo>
+                  <a:cubicBezTo>
+                    <a:pt x="339398" y="67991"/>
+                    <a:pt x="358254" y="87299"/>
+                    <a:pt x="357975" y="110839"/>
+                  </a:cubicBezTo>
+                  <a:cubicBezTo>
+                    <a:pt x="357955" y="112526"/>
+                    <a:pt x="357835" y="114209"/>
+                    <a:pt x="357616" y="115881"/>
+                  </a:cubicBezTo>
+                  <a:close/>
+                  <a:moveTo>
+                    <a:pt x="207540" y="88763"/>
+                  </a:moveTo>
+                  <a:lnTo>
+                    <a:pt x="213179" y="76381"/>
+                  </a:lnTo>
+                  <a:lnTo>
+                    <a:pt x="218818" y="63998"/>
+                  </a:lnTo>
+                  <a:cubicBezTo>
+                    <a:pt x="231429" y="36262"/>
+                    <a:pt x="252308" y="19050"/>
+                    <a:pt x="273320" y="19050"/>
+                  </a:cubicBezTo>
+                  <a:cubicBezTo>
+                    <a:pt x="279534" y="19100"/>
+                    <a:pt x="285663" y="20487"/>
+                    <a:pt x="291294" y="23117"/>
+                  </a:cubicBezTo>
+                  <a:cubicBezTo>
+                    <a:pt x="302292" y="27956"/>
+                    <a:pt x="310638" y="37345"/>
+                    <a:pt x="314154" y="48835"/>
+                  </a:cubicBezTo>
+                  <a:cubicBezTo>
+                    <a:pt x="290017" y="50643"/>
+                    <a:pt x="267483" y="61600"/>
+                    <a:pt x="251155" y="79467"/>
+                  </a:cubicBezTo>
+                  <a:cubicBezTo>
+                    <a:pt x="247993" y="82639"/>
+                    <a:pt x="235315" y="95317"/>
+                    <a:pt x="232105" y="98517"/>
+                  </a:cubicBezTo>
+                  <a:cubicBezTo>
+                    <a:pt x="217742" y="112150"/>
+                    <a:pt x="207641" y="129656"/>
+                    <a:pt x="203025" y="148914"/>
+                  </a:cubicBezTo>
+                  <a:cubicBezTo>
+                    <a:pt x="201757" y="146223"/>
+                    <a:pt x="200761" y="143412"/>
+                    <a:pt x="200054" y="140522"/>
+                  </a:cubicBezTo>
+                  <a:cubicBezTo>
+                    <a:pt x="196850" y="122914"/>
+                    <a:pt x="199479" y="104743"/>
+                    <a:pt x="207540" y="88763"/>
+                  </a:cubicBezTo>
+                  <a:close/>
+                  <a:moveTo>
+                    <a:pt x="146533" y="253555"/>
+                  </a:moveTo>
+                  <a:cubicBezTo>
+                    <a:pt x="146533" y="253555"/>
+                    <a:pt x="144189" y="253555"/>
+                    <a:pt x="143132" y="253555"/>
+                  </a:cubicBezTo>
+                  <a:cubicBezTo>
+                    <a:pt x="114262" y="253213"/>
+                    <a:pt x="85544" y="240706"/>
+                    <a:pt x="81696" y="213455"/>
+                  </a:cubicBezTo>
+                  <a:cubicBezTo>
+                    <a:pt x="81591" y="212503"/>
+                    <a:pt x="81382" y="211379"/>
+                    <a:pt x="81305" y="209788"/>
+                  </a:cubicBezTo>
+                  <a:cubicBezTo>
+                    <a:pt x="81305" y="208902"/>
+                    <a:pt x="81229" y="208064"/>
+                    <a:pt x="81229" y="207140"/>
+                  </a:cubicBezTo>
+                  <a:cubicBezTo>
+                    <a:pt x="81229" y="175536"/>
+                    <a:pt x="112014" y="161134"/>
+                    <a:pt x="142980" y="160725"/>
+                  </a:cubicBezTo>
+                  <a:cubicBezTo>
+                    <a:pt x="143418" y="160725"/>
+                    <a:pt x="143875" y="160725"/>
+                    <a:pt x="144323" y="160725"/>
+                  </a:cubicBezTo>
+                  <a:cubicBezTo>
+                    <a:pt x="145180" y="160725"/>
+                    <a:pt x="145999" y="160725"/>
+                    <a:pt x="146780" y="160649"/>
+                  </a:cubicBezTo>
+                  <a:lnTo>
+                    <a:pt x="146780" y="160696"/>
+                  </a:lnTo>
+                  <a:cubicBezTo>
+                    <a:pt x="177765" y="160782"/>
+                    <a:pt x="209017" y="175165"/>
+                    <a:pt x="209017" y="207102"/>
+                  </a:cubicBezTo>
+                  <a:cubicBezTo>
+                    <a:pt x="209167" y="215741"/>
+                    <a:pt x="206492" y="224193"/>
+                    <a:pt x="201397" y="231172"/>
+                  </a:cubicBezTo>
+                  <a:cubicBezTo>
+                    <a:pt x="200501" y="232200"/>
+                    <a:pt x="199637" y="233242"/>
+                    <a:pt x="198806" y="234296"/>
+                  </a:cubicBezTo>
+                  <a:cubicBezTo>
+                    <a:pt x="184729" y="247562"/>
+                    <a:pt x="165852" y="254518"/>
+                    <a:pt x="146533" y="253555"/>
+                  </a:cubicBezTo>
+                  <a:close/>
+                  <a:moveTo>
+                    <a:pt x="224847" y="320878"/>
+                  </a:moveTo>
+                  <a:cubicBezTo>
+                    <a:pt x="212070" y="309089"/>
+                    <a:pt x="204416" y="292767"/>
+                    <a:pt x="203521" y="275406"/>
+                  </a:cubicBezTo>
+                  <a:cubicBezTo>
+                    <a:pt x="204367" y="248215"/>
+                    <a:pt x="226158" y="226340"/>
+                    <a:pt x="253346" y="225390"/>
+                  </a:cubicBezTo>
+                  <a:cubicBezTo>
+                    <a:pt x="270952" y="226242"/>
+                    <a:pt x="287502" y="234038"/>
+                    <a:pt x="299371" y="247069"/>
+                  </a:cubicBezTo>
+                  <a:cubicBezTo>
+                    <a:pt x="299666" y="247393"/>
+                    <a:pt x="299799" y="247526"/>
+                    <a:pt x="300114" y="247821"/>
+                  </a:cubicBezTo>
+                  <a:lnTo>
+                    <a:pt x="300961" y="248707"/>
+                  </a:lnTo>
+                  <a:cubicBezTo>
+                    <a:pt x="326584" y="274482"/>
+                    <a:pt x="328955" y="306638"/>
+                    <a:pt x="306867" y="328717"/>
+                  </a:cubicBezTo>
+                  <a:cubicBezTo>
+                    <a:pt x="304469" y="331128"/>
+                    <a:pt x="301858" y="333319"/>
+                    <a:pt x="299066" y="335261"/>
+                  </a:cubicBezTo>
+                  <a:cubicBezTo>
+                    <a:pt x="296439" y="336515"/>
+                    <a:pt x="293894" y="337934"/>
+                    <a:pt x="291446" y="339509"/>
+                  </a:cubicBezTo>
+                  <a:cubicBezTo>
+                    <a:pt x="285382" y="342344"/>
+                    <a:pt x="278775" y="343822"/>
+                    <a:pt x="272082" y="343843"/>
+                  </a:cubicBezTo>
+                  <a:cubicBezTo>
+                    <a:pt x="254781" y="343098"/>
+                    <a:pt x="238485" y="335516"/>
+                    <a:pt x="226771" y="322764"/>
+                  </a:cubicBezTo>
+                  <a:cubicBezTo>
+                    <a:pt x="226771" y="322764"/>
+                    <a:pt x="225419" y="321431"/>
+                    <a:pt x="224809" y="320878"/>
+                  </a:cubicBezTo>
+                  <a:close/>
+                  <a:moveTo>
+                    <a:pt x="363226" y="373447"/>
+                  </a:moveTo>
+                  <a:cubicBezTo>
+                    <a:pt x="369234" y="391824"/>
+                    <a:pt x="367868" y="411816"/>
+                    <a:pt x="359416" y="429206"/>
+                  </a:cubicBezTo>
+                  <a:cubicBezTo>
+                    <a:pt x="357273" y="434283"/>
+                    <a:pt x="347882" y="456905"/>
+                    <a:pt x="345767" y="462115"/>
+                  </a:cubicBezTo>
+                  <a:cubicBezTo>
+                    <a:pt x="334518" y="489880"/>
+                    <a:pt x="314554" y="507130"/>
+                    <a:pt x="293675" y="507130"/>
+                  </a:cubicBezTo>
+                  <a:cubicBezTo>
+                    <a:pt x="288205" y="507095"/>
+                    <a:pt x="282795" y="505978"/>
+                    <a:pt x="277759" y="503844"/>
+                  </a:cubicBezTo>
+                  <a:cubicBezTo>
+                    <a:pt x="267553" y="499826"/>
+                    <a:pt x="259466" y="491765"/>
+                    <a:pt x="255413" y="481574"/>
+                  </a:cubicBezTo>
+                  <a:cubicBezTo>
+                    <a:pt x="249439" y="463412"/>
+                    <a:pt x="250764" y="443637"/>
+                    <a:pt x="259109" y="426434"/>
+                  </a:cubicBezTo>
+                  <a:cubicBezTo>
+                    <a:pt x="261328" y="421196"/>
+                    <a:pt x="270729" y="398431"/>
+                    <a:pt x="272806" y="393316"/>
+                  </a:cubicBezTo>
+                  <a:cubicBezTo>
+                    <a:pt x="278261" y="378590"/>
+                    <a:pt x="287852" y="365754"/>
+                    <a:pt x="300428" y="356349"/>
+                  </a:cubicBezTo>
+                  <a:cubicBezTo>
+                    <a:pt x="303530" y="354885"/>
+                    <a:pt x="306516" y="353188"/>
+                    <a:pt x="309363" y="351273"/>
+                  </a:cubicBezTo>
+                  <a:cubicBezTo>
+                    <a:pt x="314315" y="349131"/>
+                    <a:pt x="319646" y="348007"/>
+                    <a:pt x="325041" y="347967"/>
+                  </a:cubicBezTo>
+                  <a:cubicBezTo>
+                    <a:pt x="330501" y="348004"/>
+                    <a:pt x="335901" y="349122"/>
+                    <a:pt x="340928" y="351253"/>
+                  </a:cubicBezTo>
+                  <a:cubicBezTo>
+                    <a:pt x="343220" y="352219"/>
+                    <a:pt x="345425" y="353379"/>
+                    <a:pt x="347520" y="354721"/>
+                  </a:cubicBezTo>
+                  <a:cubicBezTo>
+                    <a:pt x="348148" y="355168"/>
+                    <a:pt x="348777" y="355625"/>
+                    <a:pt x="349425" y="356054"/>
+                  </a:cubicBezTo>
+                  <a:cubicBezTo>
+                    <a:pt x="355605" y="360400"/>
+                    <a:pt x="360397" y="366440"/>
+                    <a:pt x="363226" y="373447"/>
+                  </a:cubicBezTo>
+                  <a:close/>
+                  <a:moveTo>
+                    <a:pt x="702640" y="426244"/>
+                  </a:moveTo>
+                  <a:cubicBezTo>
+                    <a:pt x="711215" y="443918"/>
+                    <a:pt x="712581" y="464235"/>
+                    <a:pt x="706450" y="482898"/>
+                  </a:cubicBezTo>
+                  <a:cubicBezTo>
+                    <a:pt x="702265" y="493410"/>
+                    <a:pt x="693919" y="501722"/>
+                    <a:pt x="683390" y="505863"/>
+                  </a:cubicBezTo>
+                  <a:cubicBezTo>
+                    <a:pt x="678200" y="508063"/>
+                    <a:pt x="672626" y="509216"/>
+                    <a:pt x="666988" y="509254"/>
+                  </a:cubicBezTo>
+                  <a:cubicBezTo>
+                    <a:pt x="645490" y="509254"/>
+                    <a:pt x="624945" y="491528"/>
+                    <a:pt x="613381" y="463010"/>
+                  </a:cubicBezTo>
+                  <a:cubicBezTo>
+                    <a:pt x="611229" y="457686"/>
+                    <a:pt x="601637" y="434588"/>
+                    <a:pt x="599446" y="429397"/>
+                  </a:cubicBezTo>
+                  <a:cubicBezTo>
+                    <a:pt x="590763" y="411535"/>
+                    <a:pt x="589359" y="390999"/>
+                    <a:pt x="595532" y="372123"/>
+                  </a:cubicBezTo>
+                  <a:cubicBezTo>
+                    <a:pt x="599713" y="361660"/>
+                    <a:pt x="608030" y="353388"/>
+                    <a:pt x="618515" y="349263"/>
+                  </a:cubicBezTo>
+                  <a:cubicBezTo>
+                    <a:pt x="623704" y="347066"/>
+                    <a:pt x="629274" y="345917"/>
+                    <a:pt x="634908" y="345881"/>
+                  </a:cubicBezTo>
+                  <a:cubicBezTo>
+                    <a:pt x="656415" y="345881"/>
+                    <a:pt x="677028" y="363722"/>
+                    <a:pt x="688677" y="392449"/>
+                  </a:cubicBezTo>
+                  <a:cubicBezTo>
+                    <a:pt x="690772" y="397650"/>
+                    <a:pt x="700373" y="420900"/>
+                    <a:pt x="702640" y="426244"/>
+                  </a:cubicBezTo>
+                  <a:close/>
+                  <a:moveTo>
+                    <a:pt x="761248" y="205016"/>
+                  </a:moveTo>
+                  <a:cubicBezTo>
+                    <a:pt x="759895" y="208283"/>
+                    <a:pt x="743150" y="248641"/>
+                    <a:pt x="734349" y="269977"/>
+                  </a:cubicBezTo>
+                  <a:lnTo>
+                    <a:pt x="729044" y="282788"/>
+                  </a:lnTo>
+                  <a:cubicBezTo>
+                    <a:pt x="716051" y="314135"/>
+                    <a:pt x="695973" y="332861"/>
+                    <a:pt x="675332" y="332861"/>
+                  </a:cubicBezTo>
+                  <a:cubicBezTo>
+                    <a:pt x="669873" y="332793"/>
+                    <a:pt x="664480" y="331651"/>
+                    <a:pt x="659463" y="329498"/>
+                  </a:cubicBezTo>
+                  <a:cubicBezTo>
+                    <a:pt x="647063" y="324868"/>
+                    <a:pt x="637985" y="314093"/>
+                    <a:pt x="635527" y="301085"/>
+                  </a:cubicBezTo>
+                  <a:cubicBezTo>
+                    <a:pt x="632728" y="282773"/>
+                    <a:pt x="635434" y="264042"/>
+                    <a:pt x="643299" y="247269"/>
+                  </a:cubicBezTo>
+                  <a:lnTo>
+                    <a:pt x="675504" y="169545"/>
+                  </a:lnTo>
+                  <a:cubicBezTo>
+                    <a:pt x="688505" y="138113"/>
+                    <a:pt x="708508" y="119415"/>
+                    <a:pt x="729015" y="119415"/>
+                  </a:cubicBezTo>
+                  <a:cubicBezTo>
+                    <a:pt x="734122" y="119509"/>
+                    <a:pt x="739169" y="120543"/>
+                    <a:pt x="743903" y="122463"/>
+                  </a:cubicBezTo>
+                  <a:cubicBezTo>
+                    <a:pt x="744550" y="123046"/>
+                    <a:pt x="745279" y="123534"/>
+                    <a:pt x="746065" y="123911"/>
+                  </a:cubicBezTo>
+                  <a:cubicBezTo>
+                    <a:pt x="746587" y="124070"/>
+                    <a:pt x="747122" y="124178"/>
+                    <a:pt x="747665" y="124235"/>
+                  </a:cubicBezTo>
+                  <a:cubicBezTo>
+                    <a:pt x="758743" y="129204"/>
+                    <a:pt x="766727" y="139233"/>
+                    <a:pt x="769087" y="151143"/>
+                  </a:cubicBezTo>
+                  <a:cubicBezTo>
+                    <a:pt x="771885" y="169480"/>
+                    <a:pt x="769155" y="188236"/>
+                    <a:pt x="761248" y="205016"/>
+                  </a:cubicBezTo>
+                  <a:close/>
+                </a:path>
+              </a:pathLst>
+            </a:custGeom>
+            <a:solidFill>
+              <a:schemeClr val="bg1"/>
+            </a:solidFill>
+            <a:ln w="9525" cap="flat">
+              <a:noFill/>
+              <a:prstDash val="solid"/>
+              <a:miter/>
+            </a:ln>
+          </p:spPr>
+          <p:txBody>
+            <a:bodyPr rtlCol="0" anchor="ctr"/>
+            <a:lstStyle/>
+            <a:p>
+              <a:endParaRPr lang="ko-KR" altLang="en-US"/>
+            </a:p>
+          </p:txBody>
+        </p:sp>
+      </p:grpSp>
     </p:spTree>
     <p:extLst>
       <p:ext uri="{BB962C8B-B14F-4D97-AF65-F5344CB8AC3E}">

</xml_diff>